<commit_message>
- correction on misspelling 'assert' to 'asset' - update some content
</commit_message>
<xml_diff>
--- a/slides/egjs-codelab.pptx
+++ b/slides/egjs-codelab.pptx
@@ -11,10 +11,10 @@
     <p:sldMasterId id="2147483671" r:id="rId7"/>
   </p:sldMasterIdLst>
   <p:notesMasterIdLst>
-    <p:notesMasterId r:id="rId67"/>
+    <p:notesMasterId r:id="rId66"/>
   </p:notesMasterIdLst>
   <p:handoutMasterIdLst>
-    <p:handoutMasterId r:id="rId68"/>
+    <p:handoutMasterId r:id="rId67"/>
   </p:handoutMasterIdLst>
   <p:sldIdLst>
     <p:sldId id="460" r:id="rId8"/>
@@ -67,15 +67,14 @@
     <p:sldId id="771" r:id="rId55"/>
     <p:sldId id="772" r:id="rId56"/>
     <p:sldId id="773" r:id="rId57"/>
-    <p:sldId id="774" r:id="rId58"/>
-    <p:sldId id="775" r:id="rId59"/>
-    <p:sldId id="776" r:id="rId60"/>
-    <p:sldId id="777" r:id="rId61"/>
-    <p:sldId id="778" r:id="rId62"/>
-    <p:sldId id="779" r:id="rId63"/>
-    <p:sldId id="780" r:id="rId64"/>
-    <p:sldId id="782" r:id="rId65"/>
-    <p:sldId id="687" r:id="rId66"/>
+    <p:sldId id="775" r:id="rId58"/>
+    <p:sldId id="776" r:id="rId59"/>
+    <p:sldId id="777" r:id="rId60"/>
+    <p:sldId id="778" r:id="rId61"/>
+    <p:sldId id="779" r:id="rId62"/>
+    <p:sldId id="780" r:id="rId63"/>
+    <p:sldId id="782" r:id="rId64"/>
+    <p:sldId id="687" r:id="rId65"/>
   </p:sldIdLst>
   <p:sldSz cx="9144000" cy="6858000" type="screen4x3"/>
   <p:notesSz cx="6858000" cy="9144000"/>
@@ -3845,7 +3844,7 @@
     </p:spTree>
     <p:extLst>
       <p:ext uri="{BB962C8B-B14F-4D97-AF65-F5344CB8AC3E}">
-        <p14:creationId xmlns:p14="http://schemas.microsoft.com/office/powerpoint/2010/main" val="1213765678"/>
+        <p14:creationId xmlns:p14="http://schemas.microsoft.com/office/powerpoint/2010/main" val="3810624104"/>
       </p:ext>
     </p:extLst>
   </p:cSld>
@@ -4031,7 +4030,7 @@
     </p:spTree>
     <p:extLst>
       <p:ext uri="{BB962C8B-B14F-4D97-AF65-F5344CB8AC3E}">
-        <p14:creationId xmlns:p14="http://schemas.microsoft.com/office/powerpoint/2010/main" val="3810624104"/>
+        <p14:creationId xmlns:p14="http://schemas.microsoft.com/office/powerpoint/2010/main" val="2899225468"/>
       </p:ext>
     </p:extLst>
   </p:cSld>
@@ -4124,7 +4123,7 @@
     </p:spTree>
     <p:extLst>
       <p:ext uri="{BB962C8B-B14F-4D97-AF65-F5344CB8AC3E}">
-        <p14:creationId xmlns:p14="http://schemas.microsoft.com/office/powerpoint/2010/main" val="2899225468"/>
+        <p14:creationId xmlns:p14="http://schemas.microsoft.com/office/powerpoint/2010/main" val="3224046787"/>
       </p:ext>
     </p:extLst>
   </p:cSld>
@@ -4217,7 +4216,7 @@
     </p:spTree>
     <p:extLst>
       <p:ext uri="{BB962C8B-B14F-4D97-AF65-F5344CB8AC3E}">
-        <p14:creationId xmlns:p14="http://schemas.microsoft.com/office/powerpoint/2010/main" val="3224046787"/>
+        <p14:creationId xmlns:p14="http://schemas.microsoft.com/office/powerpoint/2010/main" val="2615784336"/>
       </p:ext>
     </p:extLst>
   </p:cSld>
@@ -4310,7 +4309,7 @@
     </p:spTree>
     <p:extLst>
       <p:ext uri="{BB962C8B-B14F-4D97-AF65-F5344CB8AC3E}">
-        <p14:creationId xmlns:p14="http://schemas.microsoft.com/office/powerpoint/2010/main" val="2615784336"/>
+        <p14:creationId xmlns:p14="http://schemas.microsoft.com/office/powerpoint/2010/main" val="2814241624"/>
       </p:ext>
     </p:extLst>
   </p:cSld>
@@ -4403,7 +4402,7 @@
     </p:spTree>
     <p:extLst>
       <p:ext uri="{BB962C8B-B14F-4D97-AF65-F5344CB8AC3E}">
-        <p14:creationId xmlns:p14="http://schemas.microsoft.com/office/powerpoint/2010/main" val="2814241624"/>
+        <p14:creationId xmlns:p14="http://schemas.microsoft.com/office/powerpoint/2010/main" val="1502909291"/>
       </p:ext>
     </p:extLst>
   </p:cSld>
@@ -4484,99 +4483,6 @@
               </a:rPr>
               <a:pPr/>
               <a:t>57</a:t>
-            </a:fld>
-            <a:endParaRPr lang="ko-KR" altLang="en-US" dirty="0">
-              <a:solidFill>
-                <a:prstClr val="black"/>
-              </a:solidFill>
-            </a:endParaRPr>
-          </a:p>
-        </p:txBody>
-      </p:sp>
-    </p:spTree>
-    <p:extLst>
-      <p:ext uri="{BB962C8B-B14F-4D97-AF65-F5344CB8AC3E}">
-        <p14:creationId xmlns:p14="http://schemas.microsoft.com/office/powerpoint/2010/main" val="1502909291"/>
-      </p:ext>
-    </p:extLst>
-  </p:cSld>
-  <p:clrMapOvr>
-    <a:masterClrMapping/>
-  </p:clrMapOvr>
-</p:notes>
-</file>
-
-<file path=ppt/notesSlides/notesSlide46.xml><?xml version="1.0" encoding="utf-8"?>
-<p:notes xmlns:a="http://schemas.openxmlformats.org/drawingml/2006/main" xmlns:r="http://schemas.openxmlformats.org/officeDocument/2006/relationships" xmlns:p="http://schemas.openxmlformats.org/presentationml/2006/main">
-  <p:cSld>
-    <p:spTree>
-      <p:nvGrpSpPr>
-        <p:cNvPr id="1" name=""/>
-        <p:cNvGrpSpPr/>
-        <p:nvPr/>
-      </p:nvGrpSpPr>
-      <p:grpSpPr>
-        <a:xfrm>
-          <a:off x="0" y="0"/>
-          <a:ext cx="0" cy="0"/>
-          <a:chOff x="0" y="0"/>
-          <a:chExt cx="0" cy="0"/>
-        </a:xfrm>
-      </p:grpSpPr>
-      <p:sp>
-        <p:nvSpPr>
-          <p:cNvPr id="2" name="슬라이드 이미지 개체 틀 1"/>
-          <p:cNvSpPr>
-            <a:spLocks noGrp="1" noRot="1" noChangeAspect="1"/>
-          </p:cNvSpPr>
-          <p:nvPr>
-            <p:ph type="sldImg"/>
-          </p:nvPr>
-        </p:nvSpPr>
-        <p:spPr/>
-      </p:sp>
-      <p:sp>
-        <p:nvSpPr>
-          <p:cNvPr id="3" name="슬라이드 노트 개체 틀 2"/>
-          <p:cNvSpPr>
-            <a:spLocks noGrp="1"/>
-          </p:cNvSpPr>
-          <p:nvPr>
-            <p:ph type="body" idx="1"/>
-          </p:nvPr>
-        </p:nvSpPr>
-        <p:spPr/>
-        <p:txBody>
-          <a:bodyPr/>
-          <a:lstStyle/>
-          <a:p>
-            <a:endParaRPr lang="ko-KR" altLang="en-US" dirty="0"/>
-          </a:p>
-        </p:txBody>
-      </p:sp>
-      <p:sp>
-        <p:nvSpPr>
-          <p:cNvPr id="4" name="슬라이드 번호 개체 틀 3"/>
-          <p:cNvSpPr>
-            <a:spLocks noGrp="1"/>
-          </p:cNvSpPr>
-          <p:nvPr>
-            <p:ph type="sldNum" sz="quarter" idx="10"/>
-          </p:nvPr>
-        </p:nvSpPr>
-        <p:spPr/>
-        <p:txBody>
-          <a:bodyPr/>
-          <a:lstStyle/>
-          <a:p>
-            <a:fld id="{E298BA0C-7778-40CB-9F43-9459B3FAC40D}" type="slidenum">
-              <a:rPr lang="ko-KR" altLang="en-US" smtClean="0">
-                <a:solidFill>
-                  <a:prstClr val="black"/>
-                </a:solidFill>
-              </a:rPr>
-              <a:pPr/>
-              <a:t>58</a:t>
             </a:fld>
             <a:endParaRPr lang="ko-KR" altLang="en-US" dirty="0">
               <a:solidFill>
@@ -18497,15 +18403,7 @@
             <a:avLst/>
           </a:prstGeom>
           <a:noFill/>
-          <a:extLst>
-            <a:ext uri="{909E8E84-426E-40DD-AFC4-6F175D3DCCD1}">
-              <a14:hiddenFill xmlns:a14="http://schemas.microsoft.com/office/drawing/2010/main">
-                <a:solidFill>
-                  <a:srgbClr val="FFFFFF"/>
-                </a:solidFill>
-              </a14:hiddenFill>
-            </a:ext>
-          </a:extLst>
+          <a:extLst/>
         </p:spPr>
       </p:pic>
       <p:sp>
@@ -28856,8 +28754,8 @@
         </p:nvSpPr>
         <p:spPr>
           <a:xfrm>
-            <a:off x="560818" y="2122578"/>
-            <a:ext cx="7986982" cy="3444020"/>
+            <a:off x="458028" y="2132856"/>
+            <a:ext cx="7986982" cy="3985706"/>
           </a:xfrm>
           <a:prstGeom prst="rect">
             <a:avLst/>
@@ -29015,7 +28913,7 @@
               <a:t>  </a:t>
             </a:r>
             <a:r>
-              <a:rPr lang="en-US" altLang="ko-KR" dirty="0" err="1">
+              <a:rPr lang="en-US" altLang="ko-KR" b="1" dirty="0" err="1">
                 <a:solidFill>
                   <a:prstClr val="black"/>
                 </a:solidFill>
@@ -29063,7 +28961,71 @@
                 <a:latin typeface="나눔고딕" panose="020D0604000000000000" pitchFamily="50" charset="-127"/>
                 <a:ea typeface="나눔고딕" panose="020D0604000000000000" pitchFamily="50" charset="-127"/>
               </a:rPr>
-              <a:t> /* 0</a:t>
+              <a:t> </a:t>
+            </a:r>
+            <a:endParaRPr lang="en-US" altLang="ko-KR" dirty="0" smtClean="0">
+              <a:solidFill>
+                <a:prstClr val="white">
+                  <a:lumMod val="50000"/>
+                </a:prstClr>
+              </a:solidFill>
+              <a:latin typeface="나눔고딕" panose="020D0604000000000000" pitchFamily="50" charset="-127"/>
+              <a:ea typeface="나눔고딕" panose="020D0604000000000000" pitchFamily="50" charset="-127"/>
+            </a:endParaRPr>
+          </a:p>
+          <a:p>
+            <a:pPr>
+              <a:lnSpc>
+                <a:spcPct val="110000"/>
+              </a:lnSpc>
+            </a:pPr>
+            <a:r>
+              <a:rPr lang="en-US" altLang="ko-KR" dirty="0">
+                <a:solidFill>
+                  <a:prstClr val="white">
+                    <a:lumMod val="50000"/>
+                  </a:prstClr>
+                </a:solidFill>
+                <a:latin typeface="나눔고딕" panose="020D0604000000000000" pitchFamily="50" charset="-127"/>
+                <a:ea typeface="나눔고딕" panose="020D0604000000000000" pitchFamily="50" charset="-127"/>
+              </a:rPr>
+              <a:t> </a:t>
+            </a:r>
+            <a:r>
+              <a:rPr lang="en-US" altLang="ko-KR" dirty="0" smtClean="0">
+                <a:solidFill>
+                  <a:prstClr val="white">
+                    <a:lumMod val="50000"/>
+                  </a:prstClr>
+                </a:solidFill>
+                <a:latin typeface="나눔고딕" panose="020D0604000000000000" pitchFamily="50" charset="-127"/>
+                <a:ea typeface="나눔고딕" panose="020D0604000000000000" pitchFamily="50" charset="-127"/>
+              </a:rPr>
+              <a:t> </a:t>
+            </a:r>
+            <a:r>
+              <a:rPr lang="en-US" altLang="ko-KR" dirty="0" smtClean="0">
+                <a:solidFill>
+                  <a:prstClr val="white">
+                    <a:lumMod val="50000"/>
+                  </a:prstClr>
+                </a:solidFill>
+                <a:latin typeface="나눔고딕" panose="020D0604000000000000" pitchFamily="50" charset="-127"/>
+                <a:ea typeface="나눔고딕" panose="020D0604000000000000" pitchFamily="50" charset="-127"/>
+              </a:rPr>
+              <a:t>/* </a:t>
+            </a:r>
+            <a:r>
+              <a:rPr lang="en-US" altLang="ko-KR" dirty="0" smtClean="0">
+                <a:solidFill>
+                  <a:prstClr val="white">
+                    <a:lumMod val="50000"/>
+                  </a:prstClr>
+                </a:solidFill>
+                <a:latin typeface="나눔고딕" panose="020D0604000000000000" pitchFamily="50" charset="-127"/>
+                <a:ea typeface="나눔고딕" panose="020D0604000000000000" pitchFamily="50" charset="-127"/>
+              </a:rPr>
+              <a:t>0</a:t>
             </a:r>
             <a:r>
               <a:rPr lang="ko-KR" altLang="en-US" dirty="0" smtClean="0">
@@ -29183,7 +29145,27 @@
                 <a:latin typeface="나눔고딕" panose="020D0604000000000000" pitchFamily="50" charset="-127"/>
                 <a:ea typeface="나눔고딕" panose="020D0604000000000000" pitchFamily="50" charset="-127"/>
               </a:rPr>
-              <a:t>  count: 30, </a:t>
+              <a:t>  </a:t>
+            </a:r>
+            <a:r>
+              <a:rPr lang="en-US" altLang="ko-KR" b="1" dirty="0">
+                <a:solidFill>
+                  <a:prstClr val="black"/>
+                </a:solidFill>
+                <a:latin typeface="나눔고딕" panose="020D0604000000000000" pitchFamily="50" charset="-127"/>
+                <a:ea typeface="나눔고딕" panose="020D0604000000000000" pitchFamily="50" charset="-127"/>
+              </a:rPr>
+              <a:t>count</a:t>
+            </a:r>
+            <a:r>
+              <a:rPr lang="en-US" altLang="ko-KR" dirty="0">
+                <a:solidFill>
+                  <a:prstClr val="black"/>
+                </a:solidFill>
+                <a:latin typeface="나눔고딕" panose="020D0604000000000000" pitchFamily="50" charset="-127"/>
+                <a:ea typeface="나눔고딕" panose="020D0604000000000000" pitchFamily="50" charset="-127"/>
+              </a:rPr>
+              <a:t>: 30, </a:t>
             </a:r>
             <a:endParaRPr lang="en-US" altLang="ko-KR" dirty="0" smtClean="0">
               <a:solidFill>
@@ -29219,78 +29201,13 @@
               </a:rPr>
               <a:t> </a:t>
             </a:r>
-            <a:r>
-              <a:rPr lang="en-US" altLang="ko-KR" dirty="0" smtClean="0">
-                <a:solidFill>
-                  <a:prstClr val="white">
-                    <a:lumMod val="50000"/>
-                  </a:prstClr>
-                </a:solidFill>
-                <a:latin typeface="나눔고딕" panose="020D0604000000000000" pitchFamily="50" charset="-127"/>
-                <a:ea typeface="나눔고딕" panose="020D0604000000000000" pitchFamily="50" charset="-127"/>
-              </a:rPr>
-              <a:t>/* </a:t>
-            </a:r>
-            <a:r>
-              <a:rPr lang="ko-KR" altLang="en-US" dirty="0">
-                <a:solidFill>
-                  <a:prstClr val="white">
-                    <a:lumMod val="50000"/>
-                  </a:prstClr>
-                </a:solidFill>
-                <a:latin typeface="나눔고딕" panose="020D0604000000000000" pitchFamily="50" charset="-127"/>
-                <a:ea typeface="나눔고딕" panose="020D0604000000000000" pitchFamily="50" charset="-127"/>
-              </a:rPr>
-              <a:t>모든 아이템의 사이즈가 동일한 경우 </a:t>
-            </a:r>
-            <a:r>
-              <a:rPr lang="en-US" altLang="ko-KR" dirty="0">
-                <a:solidFill>
-                  <a:prstClr val="white">
-                    <a:lumMod val="50000"/>
-                  </a:prstClr>
-                </a:solidFill>
-                <a:latin typeface="나눔고딕" panose="020D0604000000000000" pitchFamily="50" charset="-127"/>
-                <a:ea typeface="나눔고딕" panose="020D0604000000000000" pitchFamily="50" charset="-127"/>
-              </a:rPr>
-              <a:t>true</a:t>
-            </a:r>
-            <a:r>
-              <a:rPr lang="ko-KR" altLang="en-US" dirty="0">
-                <a:solidFill>
-                  <a:prstClr val="white">
-                    <a:lumMod val="50000"/>
-                  </a:prstClr>
-                </a:solidFill>
-                <a:latin typeface="나눔고딕" panose="020D0604000000000000" pitchFamily="50" charset="-127"/>
-                <a:ea typeface="나눔고딕" panose="020D0604000000000000" pitchFamily="50" charset="-127"/>
-              </a:rPr>
-              <a:t>로 주면 성능상 이점이 </a:t>
-            </a:r>
-            <a:r>
-              <a:rPr lang="ko-KR" altLang="en-US" dirty="0" smtClean="0">
-                <a:solidFill>
-                  <a:prstClr val="white">
-                    <a:lumMod val="50000"/>
-                  </a:prstClr>
-                </a:solidFill>
-                <a:latin typeface="나눔고딕" panose="020D0604000000000000" pitchFamily="50" charset="-127"/>
-                <a:ea typeface="나눔고딕" panose="020D0604000000000000" pitchFamily="50" charset="-127"/>
-              </a:rPr>
-              <a:t>있다 </a:t>
-            </a:r>
-            <a:r>
-              <a:rPr lang="en-US" altLang="ko-KR" dirty="0" smtClean="0">
-                <a:solidFill>
-                  <a:prstClr val="white">
-                    <a:lumMod val="50000"/>
-                  </a:prstClr>
-                </a:solidFill>
-                <a:latin typeface="나눔고딕" panose="020D0604000000000000" pitchFamily="50" charset="-127"/>
-                <a:ea typeface="나눔고딕" panose="020D0604000000000000" pitchFamily="50" charset="-127"/>
-              </a:rPr>
-              <a:t>*/</a:t>
-            </a:r>
+            <a:endParaRPr lang="en-US" altLang="ko-KR" dirty="0" smtClean="0">
+              <a:solidFill>
+                <a:prstClr val="black"/>
+              </a:solidFill>
+              <a:latin typeface="나눔고딕" panose="020D0604000000000000" pitchFamily="50" charset="-127"/>
+              <a:ea typeface="나눔고딕" panose="020D0604000000000000" pitchFamily="50" charset="-127"/>
+            </a:endParaRPr>
           </a:p>
           <a:p>
             <a:pPr>
@@ -29299,6 +29216,16 @@
               </a:lnSpc>
             </a:pPr>
             <a:r>
+              <a:rPr lang="en-US" altLang="ko-KR" dirty="0">
+                <a:solidFill>
+                  <a:prstClr val="black"/>
+                </a:solidFill>
+                <a:latin typeface="나눔고딕" panose="020D0604000000000000" pitchFamily="50" charset="-127"/>
+                <a:ea typeface="나눔고딕" panose="020D0604000000000000" pitchFamily="50" charset="-127"/>
+              </a:rPr>
+              <a:t> </a:t>
+            </a:r>
+            <a:r>
               <a:rPr lang="en-US" altLang="ko-KR" dirty="0" smtClean="0">
                 <a:solidFill>
                   <a:prstClr val="black"/>
@@ -29306,37 +29233,79 @@
                 <a:latin typeface="나눔고딕" panose="020D0604000000000000" pitchFamily="50" charset="-127"/>
                 <a:ea typeface="나눔고딕" panose="020D0604000000000000" pitchFamily="50" charset="-127"/>
               </a:rPr>
-              <a:t>  </a:t>
-            </a:r>
-            <a:r>
-              <a:rPr lang="en-US" altLang="ko-KR" dirty="0" err="1">
-                <a:solidFill>
-                  <a:prstClr val="black"/>
-                </a:solidFill>
-                <a:latin typeface="나눔고딕" panose="020D0604000000000000" pitchFamily="50" charset="-127"/>
-                <a:ea typeface="나눔고딕" panose="020D0604000000000000" pitchFamily="50" charset="-127"/>
-              </a:rPr>
-              <a:t>isEqualSize</a:t>
+              <a:t> </a:t>
+            </a:r>
+            <a:r>
+              <a:rPr lang="en-US" altLang="ko-KR" dirty="0" smtClean="0">
+                <a:solidFill>
+                  <a:prstClr val="white">
+                    <a:lumMod val="50000"/>
+                  </a:prstClr>
+                </a:solidFill>
+                <a:latin typeface="나눔고딕" panose="020D0604000000000000" pitchFamily="50" charset="-127"/>
+                <a:ea typeface="나눔고딕" panose="020D0604000000000000" pitchFamily="50" charset="-127"/>
+              </a:rPr>
+              <a:t>/* </a:t>
+            </a:r>
+            <a:r>
+              <a:rPr lang="ko-KR" altLang="en-US" dirty="0">
+                <a:solidFill>
+                  <a:prstClr val="white">
+                    <a:lumMod val="50000"/>
+                  </a:prstClr>
+                </a:solidFill>
+                <a:latin typeface="나눔고딕" panose="020D0604000000000000" pitchFamily="50" charset="-127"/>
+                <a:ea typeface="나눔고딕" panose="020D0604000000000000" pitchFamily="50" charset="-127"/>
+              </a:rPr>
+              <a:t>모든 아이템의 사이즈가 동일한 경우 </a:t>
             </a:r>
             <a:r>
               <a:rPr lang="en-US" altLang="ko-KR" dirty="0">
                 <a:solidFill>
-                  <a:prstClr val="black"/>
-                </a:solidFill>
-                <a:latin typeface="나눔고딕" panose="020D0604000000000000" pitchFamily="50" charset="-127"/>
-                <a:ea typeface="나눔고딕" panose="020D0604000000000000" pitchFamily="50" charset="-127"/>
-              </a:rPr>
-              <a:t>: </a:t>
+                  <a:prstClr val="white">
+                    <a:lumMod val="50000"/>
+                  </a:prstClr>
+                </a:solidFill>
+                <a:latin typeface="나눔고딕" panose="020D0604000000000000" pitchFamily="50" charset="-127"/>
+                <a:ea typeface="나눔고딕" panose="020D0604000000000000" pitchFamily="50" charset="-127"/>
+              </a:rPr>
+              <a:t>true</a:t>
+            </a:r>
+            <a:r>
+              <a:rPr lang="ko-KR" altLang="en-US" dirty="0">
+                <a:solidFill>
+                  <a:prstClr val="white">
+                    <a:lumMod val="50000"/>
+                  </a:prstClr>
+                </a:solidFill>
+                <a:latin typeface="나눔고딕" panose="020D0604000000000000" pitchFamily="50" charset="-127"/>
+                <a:ea typeface="나눔고딕" panose="020D0604000000000000" pitchFamily="50" charset="-127"/>
+              </a:rPr>
+              <a:t>로 주면 성능상 이점이 </a:t>
+            </a:r>
+            <a:r>
+              <a:rPr lang="ko-KR" altLang="en-US" dirty="0" smtClean="0">
+                <a:solidFill>
+                  <a:prstClr val="white">
+                    <a:lumMod val="50000"/>
+                  </a:prstClr>
+                </a:solidFill>
+                <a:latin typeface="나눔고딕" panose="020D0604000000000000" pitchFamily="50" charset="-127"/>
+                <a:ea typeface="나눔고딕" panose="020D0604000000000000" pitchFamily="50" charset="-127"/>
+              </a:rPr>
+              <a:t>있다 </a:t>
             </a:r>
             <a:r>
               <a:rPr lang="en-US" altLang="ko-KR" dirty="0" smtClean="0">
                 <a:solidFill>
-                  <a:prstClr val="black"/>
-                </a:solidFill>
-                <a:latin typeface="나눔고딕" panose="020D0604000000000000" pitchFamily="50" charset="-127"/>
-                <a:ea typeface="나눔고딕" panose="020D0604000000000000" pitchFamily="50" charset="-127"/>
-              </a:rPr>
-              <a:t>false,      	</a:t>
+                  <a:prstClr val="white">
+                    <a:lumMod val="50000"/>
+                  </a:prstClr>
+                </a:solidFill>
+                <a:latin typeface="나눔고딕" panose="020D0604000000000000" pitchFamily="50" charset="-127"/>
+                <a:ea typeface="나눔고딕" panose="020D0604000000000000" pitchFamily="50" charset="-127"/>
+              </a:rPr>
+              <a:t>*/</a:t>
             </a:r>
           </a:p>
           <a:p>
@@ -29346,88 +29315,44 @@
               </a:lnSpc>
             </a:pPr>
             <a:r>
+              <a:rPr lang="en-US" altLang="ko-KR" dirty="0" smtClean="0">
+                <a:solidFill>
+                  <a:prstClr val="black"/>
+                </a:solidFill>
+                <a:latin typeface="나눔고딕" panose="020D0604000000000000" pitchFamily="50" charset="-127"/>
+                <a:ea typeface="나눔고딕" panose="020D0604000000000000" pitchFamily="50" charset="-127"/>
+              </a:rPr>
+              <a:t>  </a:t>
+            </a:r>
+            <a:r>
+              <a:rPr lang="en-US" altLang="ko-KR" b="1" dirty="0" err="1">
+                <a:solidFill>
+                  <a:prstClr val="black"/>
+                </a:solidFill>
+                <a:latin typeface="나눔고딕" panose="020D0604000000000000" pitchFamily="50" charset="-127"/>
+                <a:ea typeface="나눔고딕" panose="020D0604000000000000" pitchFamily="50" charset="-127"/>
+              </a:rPr>
+              <a:t>isEqualSize</a:t>
+            </a:r>
+            <a:r>
               <a:rPr lang="en-US" altLang="ko-KR" dirty="0">
                 <a:solidFill>
-                  <a:prstClr val="white">
-                    <a:lumMod val="50000"/>
-                  </a:prstClr>
-                </a:solidFill>
-                <a:latin typeface="나눔고딕" panose="020D0604000000000000" pitchFamily="50" charset="-127"/>
-                <a:ea typeface="나눔고딕" panose="020D0604000000000000" pitchFamily="50" charset="-127"/>
-              </a:rPr>
-              <a:t> </a:t>
+                  <a:prstClr val="black"/>
+                </a:solidFill>
+                <a:latin typeface="나눔고딕" panose="020D0604000000000000" pitchFamily="50" charset="-127"/>
+                <a:ea typeface="나눔고딕" panose="020D0604000000000000" pitchFamily="50" charset="-127"/>
+              </a:rPr>
+              <a:t>: </a:t>
             </a:r>
             <a:r>
               <a:rPr lang="en-US" altLang="ko-KR" dirty="0" smtClean="0">
                 <a:solidFill>
-                  <a:prstClr val="white">
-                    <a:lumMod val="50000"/>
-                  </a:prstClr>
-                </a:solidFill>
-                <a:latin typeface="나눔고딕" panose="020D0604000000000000" pitchFamily="50" charset="-127"/>
-                <a:ea typeface="나눔고딕" panose="020D0604000000000000" pitchFamily="50" charset="-127"/>
-              </a:rPr>
-              <a:t> /* </a:t>
-            </a:r>
-            <a:r>
-              <a:rPr lang="ko-KR" altLang="en-US" dirty="0" err="1" smtClean="0">
-                <a:solidFill>
-                  <a:prstClr val="white">
-                    <a:lumMod val="50000"/>
-                  </a:prstClr>
-                </a:solidFill>
-                <a:latin typeface="나눔고딕" panose="020D0604000000000000" pitchFamily="50" charset="-127"/>
-                <a:ea typeface="나눔고딕" panose="020D0604000000000000" pitchFamily="50" charset="-127"/>
-              </a:rPr>
-              <a:t>초기화시</a:t>
-            </a:r>
-            <a:r>
-              <a:rPr lang="ko-KR" altLang="en-US" dirty="0" smtClean="0">
-                <a:solidFill>
-                  <a:prstClr val="white">
-                    <a:lumMod val="50000"/>
-                  </a:prstClr>
-                </a:solidFill>
-                <a:latin typeface="나눔고딕" panose="020D0604000000000000" pitchFamily="50" charset="-127"/>
-                <a:ea typeface="나눔고딕" panose="020D0604000000000000" pitchFamily="50" charset="-127"/>
-              </a:rPr>
-              <a:t> </a:t>
-            </a:r>
-            <a:r>
-              <a:rPr lang="ko-KR" altLang="en-US" dirty="0" err="1" smtClean="0">
-                <a:solidFill>
-                  <a:prstClr val="white">
-                    <a:lumMod val="50000"/>
-                  </a:prstClr>
-                </a:solidFill>
-                <a:latin typeface="나눔고딕" panose="020D0604000000000000" pitchFamily="50" charset="-127"/>
-                <a:ea typeface="나눔고딕" panose="020D0604000000000000" pitchFamily="50" charset="-127"/>
-              </a:rPr>
-              <a:t>마크업에</a:t>
-            </a:r>
-            <a:r>
-              <a:rPr lang="ko-KR" altLang="en-US" dirty="0" smtClean="0">
-                <a:solidFill>
-                  <a:prstClr val="white">
-                    <a:lumMod val="50000"/>
-                  </a:prstClr>
-                </a:solidFill>
-                <a:latin typeface="나눔고딕" panose="020D0604000000000000" pitchFamily="50" charset="-127"/>
-                <a:ea typeface="나눔고딕" panose="020D0604000000000000" pitchFamily="50" charset="-127"/>
-              </a:rPr>
-              <a:t> 아이템이 있다면</a:t>
-            </a:r>
-            <a:r>
-              <a:rPr lang="en-US" altLang="ko-KR" dirty="0" smtClean="0">
-                <a:solidFill>
-                  <a:prstClr val="white">
-                    <a:lumMod val="50000"/>
-                  </a:prstClr>
-                </a:solidFill>
-                <a:latin typeface="나눔고딕" panose="020D0604000000000000" pitchFamily="50" charset="-127"/>
-                <a:ea typeface="나눔고딕" panose="020D0604000000000000" pitchFamily="50" charset="-127"/>
-              </a:rPr>
-              <a:t>, </a:t>
+                  <a:prstClr val="black"/>
+                </a:solidFill>
+                <a:latin typeface="나눔고딕" panose="020D0604000000000000" pitchFamily="50" charset="-127"/>
+                <a:ea typeface="나눔고딕" panose="020D0604000000000000" pitchFamily="50" charset="-127"/>
+              </a:rPr>
+              <a:t>false,      	</a:t>
             </a:r>
           </a:p>
           <a:p>
@@ -29437,7 +29362,7 @@
               </a:lnSpc>
             </a:pPr>
             <a:r>
-              <a:rPr lang="ko-KR" altLang="en-US" dirty="0" smtClean="0">
+              <a:rPr lang="en-US" altLang="ko-KR" sz="1600" dirty="0">
                 <a:solidFill>
                   <a:prstClr val="white">
                     <a:lumMod val="50000"/>
@@ -29446,10 +29371,10 @@
                 <a:latin typeface="나눔고딕" panose="020D0604000000000000" pitchFamily="50" charset="-127"/>
                 <a:ea typeface="나눔고딕" panose="020D0604000000000000" pitchFamily="50" charset="-127"/>
               </a:rPr>
-              <a:t>  그룹 키를 </a:t>
-            </a:r>
-            <a:r>
-              <a:rPr lang="en-US" altLang="ko-KR" dirty="0" err="1" smtClean="0">
+              <a:t> </a:t>
+            </a:r>
+            <a:r>
+              <a:rPr lang="en-US" altLang="ko-KR" sz="1600" dirty="0" smtClean="0">
                 <a:solidFill>
                   <a:prstClr val="white">
                     <a:lumMod val="50000"/>
@@ -29458,31 +29383,7 @@
                 <a:latin typeface="나눔고딕" panose="020D0604000000000000" pitchFamily="50" charset="-127"/>
                 <a:ea typeface="나눔고딕" panose="020D0604000000000000" pitchFamily="50" charset="-127"/>
               </a:rPr>
-              <a:t>defaultGroupKey</a:t>
-            </a:r>
-            <a:r>
-              <a:rPr lang="ko-KR" altLang="en-US" dirty="0" smtClean="0">
-                <a:solidFill>
-                  <a:prstClr val="white">
-                    <a:lumMod val="50000"/>
-                  </a:prstClr>
-                </a:solidFill>
-                <a:latin typeface="나눔고딕" panose="020D0604000000000000" pitchFamily="50" charset="-127"/>
-                <a:ea typeface="나눔고딕" panose="020D0604000000000000" pitchFamily="50" charset="-127"/>
-              </a:rPr>
-              <a:t>로 지정한다</a:t>
-            </a:r>
-            <a:r>
-              <a:rPr lang="en-US" altLang="ko-KR" dirty="0" smtClean="0">
-                <a:solidFill>
-                  <a:prstClr val="white">
-                    <a:lumMod val="50000"/>
-                  </a:prstClr>
-                </a:solidFill>
-                <a:latin typeface="나눔고딕" panose="020D0604000000000000" pitchFamily="50" charset="-127"/>
-                <a:ea typeface="나눔고딕" panose="020D0604000000000000" pitchFamily="50" charset="-127"/>
-              </a:rPr>
-              <a:t>.*/</a:t>
+              <a:t> </a:t>
             </a:r>
           </a:p>
           <a:p>
@@ -29492,6 +29393,169 @@
               </a:lnSpc>
             </a:pPr>
             <a:r>
+              <a:rPr lang="en-US" altLang="ko-KR" sz="1600" dirty="0">
+                <a:solidFill>
+                  <a:prstClr val="white">
+                    <a:lumMod val="50000"/>
+                  </a:prstClr>
+                </a:solidFill>
+                <a:latin typeface="나눔고딕" panose="020D0604000000000000" pitchFamily="50" charset="-127"/>
+                <a:ea typeface="나눔고딕" panose="020D0604000000000000" pitchFamily="50" charset="-127"/>
+              </a:rPr>
+              <a:t> </a:t>
+            </a:r>
+            <a:r>
+              <a:rPr lang="en-US" altLang="ko-KR" sz="1600" dirty="0" smtClean="0">
+                <a:solidFill>
+                  <a:prstClr val="white">
+                    <a:lumMod val="50000"/>
+                  </a:prstClr>
+                </a:solidFill>
+                <a:latin typeface="나눔고딕" panose="020D0604000000000000" pitchFamily="50" charset="-127"/>
+                <a:ea typeface="나눔고딕" panose="020D0604000000000000" pitchFamily="50" charset="-127"/>
+              </a:rPr>
+              <a:t> </a:t>
+            </a:r>
+            <a:r>
+              <a:rPr lang="en-US" altLang="ko-KR" sz="1600" dirty="0" smtClean="0">
+                <a:solidFill>
+                  <a:prstClr val="white">
+                    <a:lumMod val="50000"/>
+                  </a:prstClr>
+                </a:solidFill>
+                <a:latin typeface="나눔고딕" panose="020D0604000000000000" pitchFamily="50" charset="-127"/>
+                <a:ea typeface="나눔고딕" panose="020D0604000000000000" pitchFamily="50" charset="-127"/>
+              </a:rPr>
+              <a:t>/* </a:t>
+            </a:r>
+            <a:r>
+              <a:rPr lang="ko-KR" altLang="en-US" sz="1600" dirty="0" err="1" smtClean="0">
+                <a:solidFill>
+                  <a:prstClr val="white">
+                    <a:lumMod val="50000"/>
+                  </a:prstClr>
+                </a:solidFill>
+                <a:latin typeface="나눔고딕" panose="020D0604000000000000" pitchFamily="50" charset="-127"/>
+                <a:ea typeface="나눔고딕" panose="020D0604000000000000" pitchFamily="50" charset="-127"/>
+              </a:rPr>
+              <a:t>초기화시</a:t>
+            </a:r>
+            <a:r>
+              <a:rPr lang="ko-KR" altLang="en-US" sz="1600" dirty="0" smtClean="0">
+                <a:solidFill>
+                  <a:prstClr val="white">
+                    <a:lumMod val="50000"/>
+                  </a:prstClr>
+                </a:solidFill>
+                <a:latin typeface="나눔고딕" panose="020D0604000000000000" pitchFamily="50" charset="-127"/>
+                <a:ea typeface="나눔고딕" panose="020D0604000000000000" pitchFamily="50" charset="-127"/>
+              </a:rPr>
+              <a:t> </a:t>
+            </a:r>
+            <a:r>
+              <a:rPr lang="ko-KR" altLang="en-US" sz="1600" dirty="0" err="1" smtClean="0">
+                <a:solidFill>
+                  <a:prstClr val="white">
+                    <a:lumMod val="50000"/>
+                  </a:prstClr>
+                </a:solidFill>
+                <a:latin typeface="나눔고딕" panose="020D0604000000000000" pitchFamily="50" charset="-127"/>
+                <a:ea typeface="나눔고딕" panose="020D0604000000000000" pitchFamily="50" charset="-127"/>
+              </a:rPr>
+              <a:t>마크업에</a:t>
+            </a:r>
+            <a:r>
+              <a:rPr lang="ko-KR" altLang="en-US" sz="1600" dirty="0" smtClean="0">
+                <a:solidFill>
+                  <a:prstClr val="white">
+                    <a:lumMod val="50000"/>
+                  </a:prstClr>
+                </a:solidFill>
+                <a:latin typeface="나눔고딕" panose="020D0604000000000000" pitchFamily="50" charset="-127"/>
+                <a:ea typeface="나눔고딕" panose="020D0604000000000000" pitchFamily="50" charset="-127"/>
+              </a:rPr>
+              <a:t> 아이템이 있다면</a:t>
+            </a:r>
+            <a:r>
+              <a:rPr lang="en-US" altLang="ko-KR" sz="1600" dirty="0" smtClean="0">
+                <a:solidFill>
+                  <a:prstClr val="white">
+                    <a:lumMod val="50000"/>
+                  </a:prstClr>
+                </a:solidFill>
+                <a:latin typeface="나눔고딕" panose="020D0604000000000000" pitchFamily="50" charset="-127"/>
+                <a:ea typeface="나눔고딕" panose="020D0604000000000000" pitchFamily="50" charset="-127"/>
+              </a:rPr>
+              <a:t>, </a:t>
+            </a:r>
+            <a:r>
+              <a:rPr lang="ko-KR" altLang="en-US" sz="1600" dirty="0" smtClean="0">
+                <a:solidFill>
+                  <a:prstClr val="white">
+                    <a:lumMod val="50000"/>
+                  </a:prstClr>
+                </a:solidFill>
+                <a:latin typeface="나눔고딕" panose="020D0604000000000000" pitchFamily="50" charset="-127"/>
+                <a:ea typeface="나눔고딕" panose="020D0604000000000000" pitchFamily="50" charset="-127"/>
+              </a:rPr>
+              <a:t>그룹 </a:t>
+            </a:r>
+            <a:r>
+              <a:rPr lang="ko-KR" altLang="en-US" sz="1600" dirty="0" smtClean="0">
+                <a:solidFill>
+                  <a:prstClr val="white">
+                    <a:lumMod val="50000"/>
+                  </a:prstClr>
+                </a:solidFill>
+                <a:latin typeface="나눔고딕" panose="020D0604000000000000" pitchFamily="50" charset="-127"/>
+                <a:ea typeface="나눔고딕" panose="020D0604000000000000" pitchFamily="50" charset="-127"/>
+              </a:rPr>
+              <a:t>키를 </a:t>
+            </a:r>
+            <a:r>
+              <a:rPr lang="en-US" altLang="ko-KR" sz="1600" dirty="0" err="1" smtClean="0">
+                <a:solidFill>
+                  <a:prstClr val="white">
+                    <a:lumMod val="50000"/>
+                  </a:prstClr>
+                </a:solidFill>
+                <a:latin typeface="나눔고딕" panose="020D0604000000000000" pitchFamily="50" charset="-127"/>
+                <a:ea typeface="나눔고딕" panose="020D0604000000000000" pitchFamily="50" charset="-127"/>
+              </a:rPr>
+              <a:t>defaultGroupKey</a:t>
+            </a:r>
+            <a:r>
+              <a:rPr lang="ko-KR" altLang="en-US" sz="1600" dirty="0" smtClean="0">
+                <a:solidFill>
+                  <a:prstClr val="white">
+                    <a:lumMod val="50000"/>
+                  </a:prstClr>
+                </a:solidFill>
+                <a:latin typeface="나눔고딕" panose="020D0604000000000000" pitchFamily="50" charset="-127"/>
+                <a:ea typeface="나눔고딕" panose="020D0604000000000000" pitchFamily="50" charset="-127"/>
+              </a:rPr>
+              <a:t>로 지정한다</a:t>
+            </a:r>
+            <a:r>
+              <a:rPr lang="en-US" altLang="ko-KR" sz="1600" dirty="0" smtClean="0">
+                <a:solidFill>
+                  <a:prstClr val="white">
+                    <a:lumMod val="50000"/>
+                  </a:prstClr>
+                </a:solidFill>
+                <a:latin typeface="나눔고딕" panose="020D0604000000000000" pitchFamily="50" charset="-127"/>
+                <a:ea typeface="나눔고딕" panose="020D0604000000000000" pitchFamily="50" charset="-127"/>
+              </a:rPr>
+              <a:t>.*/</a:t>
+            </a:r>
+          </a:p>
+          <a:p>
+            <a:pPr>
+              <a:lnSpc>
+                <a:spcPct val="110000"/>
+              </a:lnSpc>
+            </a:pPr>
+            <a:r>
               <a:rPr lang="en-US" altLang="ko-KR" dirty="0" smtClean="0">
                 <a:solidFill>
                   <a:prstClr val="black"/>
@@ -29502,7 +29566,7 @@
               <a:t>  </a:t>
             </a:r>
             <a:r>
-              <a:rPr lang="en-US" altLang="ko-KR" dirty="0" err="1">
+              <a:rPr lang="en-US" altLang="ko-KR" b="1" dirty="0" err="1">
                 <a:solidFill>
                   <a:prstClr val="black"/>
                 </a:solidFill>
@@ -32778,7 +32842,11 @@
             <a:graphicFrameLocks noGrp="1"/>
           </p:cNvGraphicFramePr>
           <p:nvPr>
-            <p:extLst/>
+            <p:extLst>
+              <p:ext uri="{D42A27DB-BD31-4B8C-83A1-F6EECF244321}">
+                <p14:modId xmlns:p14="http://schemas.microsoft.com/office/powerpoint/2010/main" val="2103837327"/>
+              </p:ext>
+            </p:extLst>
           </p:nvPr>
         </p:nvGraphicFramePr>
         <p:xfrm>
@@ -32878,19 +32946,31 @@
                         <a:defRPr/>
                       </a:pPr>
                       <a:r>
-                        <a:rPr lang="en-US" altLang="ko-KR" dirty="0" smtClean="0"/>
+                        <a:rPr lang="en-US" altLang="ko-KR" b="0" dirty="0" smtClean="0">
+                          <a:latin typeface="나눔고딕" panose="020D0604000000000000" pitchFamily="50" charset="-127"/>
+                          <a:ea typeface="나눔고딕" panose="020D0604000000000000" pitchFamily="50" charset="-127"/>
+                        </a:rPr>
                         <a:t>Append, prepend, layout </a:t>
                       </a:r>
                       <a:r>
-                        <a:rPr lang="ko-KR" altLang="en-US" dirty="0" err="1" smtClean="0"/>
+                        <a:rPr lang="ko-KR" altLang="en-US" b="0" dirty="0" err="1" smtClean="0">
+                          <a:latin typeface="나눔고딕" panose="020D0604000000000000" pitchFamily="50" charset="-127"/>
+                          <a:ea typeface="나눔고딕" panose="020D0604000000000000" pitchFamily="50" charset="-127"/>
+                        </a:rPr>
                         <a:t>메소드</a:t>
                       </a:r>
                       <a:r>
-                        <a:rPr lang="ko-KR" altLang="en-US" dirty="0" smtClean="0"/>
+                        <a:rPr lang="ko-KR" altLang="en-US" b="0" dirty="0" smtClean="0">
+                          <a:latin typeface="나눔고딕" panose="020D0604000000000000" pitchFamily="50" charset="-127"/>
+                          <a:ea typeface="나눔고딕" panose="020D0604000000000000" pitchFamily="50" charset="-127"/>
+                        </a:rPr>
                         <a:t> 호출 후</a:t>
                       </a:r>
                       <a:r>
-                        <a:rPr lang="en-US" altLang="ko-KR" dirty="0" smtClean="0"/>
+                        <a:rPr lang="en-US" altLang="ko-KR" b="0" dirty="0" smtClean="0">
+                          <a:latin typeface="나눔고딕" panose="020D0604000000000000" pitchFamily="50" charset="-127"/>
+                          <a:ea typeface="나눔고딕" panose="020D0604000000000000" pitchFamily="50" charset="-127"/>
+                        </a:rPr>
                         <a:t>,</a:t>
                       </a:r>
                     </a:p>
@@ -32913,10 +32993,13 @@
                         <a:defRPr/>
                       </a:pPr>
                       <a:r>
-                        <a:rPr lang="ko-KR" altLang="en-US" dirty="0" smtClean="0"/>
+                        <a:rPr lang="ko-KR" altLang="en-US" b="0" dirty="0" smtClean="0">
+                          <a:latin typeface="나눔고딕" panose="020D0604000000000000" pitchFamily="50" charset="-127"/>
+                          <a:ea typeface="나눔고딕" panose="020D0604000000000000" pitchFamily="50" charset="-127"/>
+                        </a:rPr>
                         <a:t>카드의 배치가 완료 되었을 때 발생</a:t>
                       </a:r>
-                      <a:endParaRPr lang="ko-KR" altLang="en-US" dirty="0">
+                      <a:endParaRPr lang="ko-KR" altLang="en-US" b="0" dirty="0">
                         <a:latin typeface="나눔고딕" panose="020D0604000000000000" pitchFamily="50" charset="-127"/>
                         <a:ea typeface="나눔고딕" panose="020D0604000000000000" pitchFamily="50" charset="-127"/>
                       </a:endParaRPr>
@@ -36031,8 +36114,8 @@
         </p:nvSpPr>
         <p:spPr>
           <a:xfrm>
-            <a:off x="683568" y="1340768"/>
-            <a:ext cx="7344816" cy="4216539"/>
+            <a:off x="441239" y="692696"/>
+            <a:ext cx="7990717" cy="5970865"/>
           </a:xfrm>
           <a:prstGeom prst="rect">
             <a:avLst/>
@@ -36154,22 +36237,28 @@
             </a:endParaRPr>
           </a:p>
           <a:p>
-            <a:pPr marL="514350" indent="-514350">
-              <a:buFontTx/>
-              <a:buAutoNum type="arabicParenR"/>
-            </a:pPr>
-            <a:r>
-              <a:rPr lang="en-US" altLang="ko-KR" sz="2400" dirty="0" err="1" smtClean="0">
+            <a:r>
+              <a:rPr lang="en-US" altLang="ko-KR" dirty="0" smtClean="0">
                 <a:solidFill>
                   <a:prstClr val="black"/>
                 </a:solidFill>
                 <a:latin typeface="나눔고딕" panose="020D0604000000000000" pitchFamily="50" charset="-127"/>
                 <a:ea typeface="나눔고딕" panose="020D0604000000000000" pitchFamily="50" charset="-127"/>
               </a:rPr>
+              <a:t>1) </a:t>
+            </a:r>
+            <a:r>
+              <a:rPr lang="en-US" altLang="ko-KR" dirty="0" err="1" smtClean="0">
+                <a:solidFill>
+                  <a:prstClr val="black"/>
+                </a:solidFill>
+                <a:latin typeface="나눔고딕" panose="020D0604000000000000" pitchFamily="50" charset="-127"/>
+                <a:ea typeface="나눔고딕" panose="020D0604000000000000" pitchFamily="50" charset="-127"/>
+              </a:rPr>
               <a:t>createInfiniteGrid</a:t>
             </a:r>
             <a:r>
-              <a:rPr lang="ko-KR" altLang="en-US" sz="2400" dirty="0" smtClean="0">
+              <a:rPr lang="ko-KR" altLang="en-US" dirty="0" smtClean="0">
                 <a:solidFill>
                   <a:prstClr val="black"/>
                 </a:solidFill>
@@ -36178,7 +36267,7 @@
               </a:rPr>
               <a:t>에서</a:t>
             </a:r>
-            <a:endParaRPr lang="en-US" altLang="ko-KR" sz="2400" dirty="0" smtClean="0">
+            <a:endParaRPr lang="en-US" altLang="ko-KR" dirty="0" smtClean="0">
               <a:solidFill>
                 <a:prstClr val="black"/>
               </a:solidFill>
@@ -36187,12 +36276,12 @@
             </a:endParaRPr>
           </a:p>
           <a:p>
-            <a:pPr marL="971550" lvl="1" indent="-514350">
-              <a:buFontTx/>
-              <a:buAutoNum type="arabicParenR"/>
+            <a:pPr marL="742950" lvl="1" indent="-285750">
+              <a:buFont typeface="Arial" panose="020B0604020202020204" pitchFamily="34" charset="0"/>
+              <a:buChar char="•"/>
             </a:pPr>
             <a:r>
-              <a:rPr lang="en-US" altLang="ko-KR" sz="2400" dirty="0" err="1" smtClean="0">
+              <a:rPr lang="en-US" altLang="ko-KR" dirty="0" err="1" smtClean="0">
                 <a:solidFill>
                   <a:prstClr val="black"/>
                 </a:solidFill>
@@ -36202,7 +36291,7 @@
               <a:t>InfiniteGrid</a:t>
             </a:r>
             <a:r>
-              <a:rPr lang="ko-KR" altLang="en-US" sz="2400" dirty="0" smtClean="0">
+              <a:rPr lang="ko-KR" altLang="en-US" dirty="0" smtClean="0">
                 <a:solidFill>
                   <a:prstClr val="black"/>
                 </a:solidFill>
@@ -36212,7 +36301,7 @@
               <a:t>를 </a:t>
             </a:r>
             <a:r>
-              <a:rPr lang="en-US" altLang="ko-KR" sz="2400" dirty="0" err="1" smtClean="0">
+              <a:rPr lang="en-US" altLang="ko-KR" dirty="0" err="1" smtClean="0">
                 <a:solidFill>
                   <a:prstClr val="black"/>
                 </a:solidFill>
@@ -36222,7 +36311,7 @@
               <a:t>jQuery</a:t>
             </a:r>
             <a:r>
-              <a:rPr lang="en-US" altLang="ko-KR" sz="2400" dirty="0" smtClean="0">
+              <a:rPr lang="en-US" altLang="ko-KR" dirty="0" smtClean="0">
                 <a:solidFill>
                   <a:prstClr val="black"/>
                 </a:solidFill>
@@ -36232,7 +36321,7 @@
               <a:t> plugin </a:t>
             </a:r>
             <a:r>
-              <a:rPr lang="ko-KR" altLang="en-US" sz="2400" dirty="0" smtClean="0">
+              <a:rPr lang="ko-KR" altLang="en-US" dirty="0" smtClean="0">
                 <a:solidFill>
                   <a:prstClr val="black"/>
                 </a:solidFill>
@@ -36241,7 +36330,7 @@
               </a:rPr>
               <a:t>방식으로 변경</a:t>
             </a:r>
-            <a:endParaRPr lang="en-US" altLang="ko-KR" sz="2400" dirty="0" smtClean="0">
+            <a:endParaRPr lang="en-US" altLang="ko-KR" dirty="0" smtClean="0">
               <a:solidFill>
                 <a:prstClr val="black"/>
               </a:solidFill>
@@ -36250,12 +36339,12 @@
             </a:endParaRPr>
           </a:p>
           <a:p>
-            <a:pPr marL="971550" lvl="1" indent="-514350">
-              <a:buFontTx/>
-              <a:buAutoNum type="arabicParenR"/>
+            <a:pPr marL="742950" lvl="1" indent="-285750">
+              <a:buFont typeface="Arial" panose="020B0604020202020204" pitchFamily="34" charset="0"/>
+              <a:buChar char="•"/>
             </a:pPr>
             <a:r>
-              <a:rPr lang="en-US" altLang="ko-KR" sz="2400" dirty="0" err="1" smtClean="0">
+              <a:rPr lang="en-US" altLang="ko-KR" dirty="0" err="1" smtClean="0">
                 <a:solidFill>
                   <a:prstClr val="black"/>
                 </a:solidFill>
@@ -36265,7 +36354,7 @@
               <a:t>this.inst</a:t>
             </a:r>
             <a:r>
-              <a:rPr lang="ko-KR" altLang="en-US" sz="2400" dirty="0">
+              <a:rPr lang="ko-KR" altLang="en-US" dirty="0">
                 <a:solidFill>
                   <a:prstClr val="black"/>
                 </a:solidFill>
@@ -36275,7 +36364,7 @@
               <a:t>에 </a:t>
             </a:r>
             <a:r>
-              <a:rPr lang="en-US" altLang="ko-KR" sz="2400" dirty="0" err="1">
+              <a:rPr lang="en-US" altLang="ko-KR" dirty="0" err="1">
                 <a:solidFill>
                   <a:prstClr val="black"/>
                 </a:solidFill>
@@ -36285,7 +36374,7 @@
               <a:t>infiniteGrid</a:t>
             </a:r>
             <a:r>
-              <a:rPr lang="en-US" altLang="ko-KR" sz="2400" dirty="0">
+              <a:rPr lang="en-US" altLang="ko-KR" dirty="0">
                 <a:solidFill>
                   <a:prstClr val="black"/>
                 </a:solidFill>
@@ -36295,7 +36384,7 @@
               <a:t> </a:t>
             </a:r>
             <a:r>
-              <a:rPr lang="en-US" altLang="ko-KR" sz="2400" dirty="0" smtClean="0">
+              <a:rPr lang="en-US" altLang="ko-KR" dirty="0" smtClean="0">
                 <a:solidFill>
                   <a:prstClr val="black"/>
                 </a:solidFill>
@@ -36305,7 +36394,7 @@
               <a:t>instance</a:t>
             </a:r>
             <a:r>
-              <a:rPr lang="ko-KR" altLang="en-US" sz="2400" dirty="0" smtClean="0">
+              <a:rPr lang="ko-KR" altLang="en-US" dirty="0" smtClean="0">
                 <a:solidFill>
                   <a:prstClr val="black"/>
                 </a:solidFill>
@@ -36314,7 +36403,7 @@
               </a:rPr>
               <a:t>를 저장</a:t>
             </a:r>
-            <a:endParaRPr lang="en-US" altLang="ko-KR" sz="2400" dirty="0" smtClean="0">
+            <a:endParaRPr lang="en-US" altLang="ko-KR" dirty="0" smtClean="0">
               <a:solidFill>
                 <a:prstClr val="black"/>
               </a:solidFill>
@@ -36323,12 +36412,12 @@
             </a:endParaRPr>
           </a:p>
           <a:p>
-            <a:pPr marL="971550" lvl="1" indent="-514350">
-              <a:buFontTx/>
-              <a:buAutoNum type="arabicParenR"/>
+            <a:pPr marL="742950" lvl="1" indent="-285750">
+              <a:buFont typeface="Arial" panose="020B0604020202020204" pitchFamily="34" charset="0"/>
+              <a:buChar char="•"/>
             </a:pPr>
             <a:r>
-              <a:rPr lang="ko-KR" altLang="en-US" sz="2400" dirty="0">
+              <a:rPr lang="ko-KR" altLang="en-US" dirty="0" smtClean="0">
                 <a:solidFill>
                   <a:prstClr val="black"/>
                 </a:solidFill>
@@ -36338,7 +36427,7 @@
               <a:t>계속 증가시키기 위해서 </a:t>
             </a:r>
             <a:r>
-              <a:rPr lang="en-US" altLang="ko-KR" sz="2400" b="1" dirty="0">
+              <a:rPr lang="en-US" altLang="ko-KR" b="1" dirty="0" smtClean="0">
                 <a:solidFill>
                   <a:srgbClr val="C00000"/>
                 </a:solidFill>
@@ -36348,7 +36437,7 @@
               <a:t>count</a:t>
             </a:r>
             <a:r>
-              <a:rPr lang="ko-KR" altLang="en-US" sz="2400" b="1" dirty="0">
+              <a:rPr lang="ko-KR" altLang="en-US" b="1" dirty="0" smtClean="0">
                 <a:solidFill>
                   <a:srgbClr val="C00000"/>
                 </a:solidFill>
@@ -36358,7 +36447,7 @@
               <a:t>를 </a:t>
             </a:r>
             <a:r>
-              <a:rPr lang="en-US" altLang="ko-KR" sz="2400" b="1" dirty="0">
+              <a:rPr lang="en-US" altLang="ko-KR" b="1" dirty="0" smtClean="0">
                 <a:solidFill>
                   <a:srgbClr val="C00000"/>
                 </a:solidFill>
@@ -36368,26 +36457,16 @@
               <a:t>-1</a:t>
             </a:r>
             <a:r>
-              <a:rPr lang="ko-KR" altLang="en-US" sz="2400" dirty="0">
+              <a:rPr lang="ko-KR" altLang="en-US" dirty="0" smtClean="0">
                 <a:solidFill>
                   <a:prstClr val="black"/>
                 </a:solidFill>
                 <a:latin typeface="나눔고딕" panose="020D0604000000000000" pitchFamily="50" charset="-127"/>
                 <a:ea typeface="나눔고딕" panose="020D0604000000000000" pitchFamily="50" charset="-127"/>
               </a:rPr>
-              <a:t>로 </a:t>
-            </a:r>
-            <a:r>
-              <a:rPr lang="ko-KR" altLang="en-US" sz="2400" dirty="0" smtClean="0">
-                <a:solidFill>
-                  <a:prstClr val="black"/>
-                </a:solidFill>
-                <a:latin typeface="나눔고딕" panose="020D0604000000000000" pitchFamily="50" charset="-127"/>
-                <a:ea typeface="나눔고딕" panose="020D0604000000000000" pitchFamily="50" charset="-127"/>
-              </a:rPr>
-              <a:t>지정</a:t>
-            </a:r>
-            <a:endParaRPr lang="en-US" altLang="ko-KR" sz="2400" dirty="0" smtClean="0">
+              <a:t>로 지정</a:t>
+            </a:r>
+            <a:endParaRPr lang="en-US" altLang="ko-KR" sz="500" dirty="0">
               <a:solidFill>
                 <a:prstClr val="black"/>
               </a:solidFill>
@@ -36396,6 +36475,428 @@
             </a:endParaRPr>
           </a:p>
           <a:p>
+            <a:endParaRPr lang="en-US" altLang="ko-KR" dirty="0" smtClean="0">
+              <a:solidFill>
+                <a:prstClr val="black"/>
+              </a:solidFill>
+              <a:latin typeface="나눔고딕" panose="020D0604000000000000" pitchFamily="50" charset="-127"/>
+              <a:ea typeface="나눔고딕" panose="020D0604000000000000" pitchFamily="50" charset="-127"/>
+            </a:endParaRPr>
+          </a:p>
+          <a:p>
+            <a:r>
+              <a:rPr lang="en-US" altLang="ko-KR" dirty="0" smtClean="0">
+                <a:solidFill>
+                  <a:prstClr val="black"/>
+                </a:solidFill>
+                <a:latin typeface="나눔고딕" panose="020D0604000000000000" pitchFamily="50" charset="-127"/>
+                <a:ea typeface="나눔고딕" panose="020D0604000000000000" pitchFamily="50" charset="-127"/>
+              </a:rPr>
+              <a:t>2) “append</a:t>
+            </a:r>
+            <a:r>
+              <a:rPr lang="en-US" altLang="ko-KR" dirty="0">
+                <a:solidFill>
+                  <a:prstClr val="black"/>
+                </a:solidFill>
+                <a:latin typeface="나눔고딕" panose="020D0604000000000000" pitchFamily="50" charset="-127"/>
+                <a:ea typeface="나눔고딕" panose="020D0604000000000000" pitchFamily="50" charset="-127"/>
+              </a:rPr>
+              <a:t>” </a:t>
+            </a:r>
+            <a:r>
+              <a:rPr lang="ko-KR" altLang="en-US" dirty="0">
+                <a:solidFill>
+                  <a:prstClr val="black"/>
+                </a:solidFill>
+                <a:latin typeface="나눔고딕" panose="020D0604000000000000" pitchFamily="50" charset="-127"/>
+                <a:ea typeface="나눔고딕" panose="020D0604000000000000" pitchFamily="50" charset="-127"/>
+              </a:rPr>
+              <a:t>이벤트 발생시</a:t>
+            </a:r>
+            <a:r>
+              <a:rPr lang="en-US" altLang="ko-KR" dirty="0">
+                <a:solidFill>
+                  <a:prstClr val="black"/>
+                </a:solidFill>
+                <a:latin typeface="나눔고딕" panose="020D0604000000000000" pitchFamily="50" charset="-127"/>
+                <a:ea typeface="나눔고딕" panose="020D0604000000000000" pitchFamily="50" charset="-127"/>
+              </a:rPr>
+              <a:t>, </a:t>
+            </a:r>
+            <a:r>
+              <a:rPr lang="en-US" altLang="ko-KR" dirty="0" err="1">
+                <a:solidFill>
+                  <a:srgbClr val="00B0F0"/>
+                </a:solidFill>
+                <a:latin typeface="나눔고딕" panose="020D0604000000000000" pitchFamily="50" charset="-127"/>
+                <a:ea typeface="나눔고딕" panose="020D0604000000000000" pitchFamily="50" charset="-127"/>
+              </a:rPr>
+              <a:t>data.getItems</a:t>
+            </a:r>
+            <a:r>
+              <a:rPr lang="en-US" altLang="ko-KR" dirty="0">
+                <a:solidFill>
+                  <a:srgbClr val="00B0F0"/>
+                </a:solidFill>
+                <a:latin typeface="나눔고딕" panose="020D0604000000000000" pitchFamily="50" charset="-127"/>
+                <a:ea typeface="나눔고딕" panose="020D0604000000000000" pitchFamily="50" charset="-127"/>
+              </a:rPr>
+              <a:t>()</a:t>
+            </a:r>
+            <a:r>
+              <a:rPr lang="ko-KR" altLang="en-US" dirty="0">
+                <a:solidFill>
+                  <a:prstClr val="black"/>
+                </a:solidFill>
+                <a:latin typeface="나눔고딕" panose="020D0604000000000000" pitchFamily="50" charset="-127"/>
+                <a:ea typeface="나눔고딕" panose="020D0604000000000000" pitchFamily="50" charset="-127"/>
+              </a:rPr>
+              <a:t>를 이용하여 얻은 데이터를 </a:t>
+            </a:r>
+            <a:endParaRPr lang="en-US" altLang="ko-KR" dirty="0" smtClean="0">
+              <a:solidFill>
+                <a:prstClr val="black"/>
+              </a:solidFill>
+              <a:latin typeface="나눔고딕" panose="020D0604000000000000" pitchFamily="50" charset="-127"/>
+              <a:ea typeface="나눔고딕" panose="020D0604000000000000" pitchFamily="50" charset="-127"/>
+            </a:endParaRPr>
+          </a:p>
+          <a:p>
+            <a:r>
+              <a:rPr lang="en-US" altLang="ko-KR" dirty="0">
+                <a:solidFill>
+                  <a:prstClr val="black"/>
+                </a:solidFill>
+                <a:latin typeface="나눔고딕" panose="020D0604000000000000" pitchFamily="50" charset="-127"/>
+                <a:ea typeface="나눔고딕" panose="020D0604000000000000" pitchFamily="50" charset="-127"/>
+              </a:rPr>
+              <a:t> </a:t>
+            </a:r>
+            <a:r>
+              <a:rPr lang="en-US" altLang="ko-KR" dirty="0" smtClean="0">
+                <a:solidFill>
+                  <a:prstClr val="black"/>
+                </a:solidFill>
+                <a:latin typeface="나눔고딕" panose="020D0604000000000000" pitchFamily="50" charset="-127"/>
+                <a:ea typeface="나눔고딕" panose="020D0604000000000000" pitchFamily="50" charset="-127"/>
+              </a:rPr>
+              <a:t>    append</a:t>
+            </a:r>
+            <a:r>
+              <a:rPr lang="ko-KR" altLang="en-US" dirty="0">
+                <a:solidFill>
+                  <a:prstClr val="black"/>
+                </a:solidFill>
+                <a:latin typeface="나눔고딕" panose="020D0604000000000000" pitchFamily="50" charset="-127"/>
+                <a:ea typeface="나눔고딕" panose="020D0604000000000000" pitchFamily="50" charset="-127"/>
+              </a:rPr>
+              <a:t>한다</a:t>
+            </a:r>
+            <a:r>
+              <a:rPr lang="en-US" altLang="ko-KR" dirty="0" smtClean="0">
+                <a:solidFill>
+                  <a:prstClr val="black"/>
+                </a:solidFill>
+                <a:latin typeface="나눔고딕" panose="020D0604000000000000" pitchFamily="50" charset="-127"/>
+                <a:ea typeface="나눔고딕" panose="020D0604000000000000" pitchFamily="50" charset="-127"/>
+              </a:rPr>
+              <a:t>.</a:t>
+            </a:r>
+          </a:p>
+          <a:p>
+            <a:endParaRPr lang="en-US" altLang="ko-KR" dirty="0">
+              <a:solidFill>
+                <a:prstClr val="black"/>
+              </a:solidFill>
+              <a:latin typeface="나눔고딕" panose="020D0604000000000000" pitchFamily="50" charset="-127"/>
+              <a:ea typeface="나눔고딕" panose="020D0604000000000000" pitchFamily="50" charset="-127"/>
+            </a:endParaRPr>
+          </a:p>
+          <a:p>
+            <a:r>
+              <a:rPr lang="en-US" altLang="ko-KR" dirty="0" smtClean="0">
+                <a:solidFill>
+                  <a:prstClr val="black"/>
+                </a:solidFill>
+                <a:latin typeface="나눔고딕" panose="020D0604000000000000" pitchFamily="50" charset="-127"/>
+                <a:ea typeface="나눔고딕" panose="020D0604000000000000" pitchFamily="50" charset="-127"/>
+              </a:rPr>
+              <a:t>3) </a:t>
+            </a:r>
+            <a:r>
+              <a:rPr lang="ko-KR" altLang="en-US" dirty="0" smtClean="0">
+                <a:solidFill>
+                  <a:prstClr val="black"/>
+                </a:solidFill>
+                <a:latin typeface="나눔고딕" panose="020D0604000000000000" pitchFamily="50" charset="-127"/>
+                <a:ea typeface="나눔고딕" panose="020D0604000000000000" pitchFamily="50" charset="-127"/>
+              </a:rPr>
+              <a:t>데이터는 </a:t>
+            </a:r>
+            <a:r>
+              <a:rPr lang="en-US" altLang="ko-KR" dirty="0">
+                <a:solidFill>
+                  <a:prstClr val="black"/>
+                </a:solidFill>
+                <a:latin typeface="나눔고딕" panose="020D0604000000000000" pitchFamily="50" charset="-127"/>
+                <a:ea typeface="나눔고딕" panose="020D0604000000000000" pitchFamily="50" charset="-127"/>
+              </a:rPr>
+              <a:t>append </a:t>
+            </a:r>
+            <a:r>
+              <a:rPr lang="ko-KR" altLang="en-US" dirty="0" err="1">
+                <a:solidFill>
+                  <a:prstClr val="black"/>
+                </a:solidFill>
+                <a:latin typeface="나눔고딕" panose="020D0604000000000000" pitchFamily="50" charset="-127"/>
+                <a:ea typeface="나눔고딕" panose="020D0604000000000000" pitchFamily="50" charset="-127"/>
+              </a:rPr>
+              <a:t>메소드를</a:t>
+            </a:r>
+            <a:r>
+              <a:rPr lang="ko-KR" altLang="en-US" dirty="0">
+                <a:solidFill>
+                  <a:prstClr val="black"/>
+                </a:solidFill>
+                <a:latin typeface="나눔고딕" panose="020D0604000000000000" pitchFamily="50" charset="-127"/>
+                <a:ea typeface="나눔고딕" panose="020D0604000000000000" pitchFamily="50" charset="-127"/>
+              </a:rPr>
+              <a:t> 이용하여 저장한다</a:t>
+            </a:r>
+            <a:r>
+              <a:rPr lang="en-US" altLang="ko-KR" dirty="0" smtClean="0">
+                <a:solidFill>
+                  <a:prstClr val="black"/>
+                </a:solidFill>
+                <a:latin typeface="나눔고딕" panose="020D0604000000000000" pitchFamily="50" charset="-127"/>
+                <a:ea typeface="나눔고딕" panose="020D0604000000000000" pitchFamily="50" charset="-127"/>
+              </a:rPr>
+              <a:t>.</a:t>
+            </a:r>
+          </a:p>
+          <a:p>
+            <a:endParaRPr lang="en-US" altLang="ko-KR" dirty="0">
+              <a:solidFill>
+                <a:prstClr val="black"/>
+              </a:solidFill>
+              <a:latin typeface="나눔고딕" panose="020D0604000000000000" pitchFamily="50" charset="-127"/>
+              <a:ea typeface="나눔고딕" panose="020D0604000000000000" pitchFamily="50" charset="-127"/>
+            </a:endParaRPr>
+          </a:p>
+          <a:p>
+            <a:r>
+              <a:rPr lang="en-US" altLang="ko-KR" dirty="0" smtClean="0">
+                <a:solidFill>
+                  <a:prstClr val="black"/>
+                </a:solidFill>
+                <a:latin typeface="나눔고딕" panose="020D0604000000000000" pitchFamily="50" charset="-127"/>
+                <a:ea typeface="나눔고딕" panose="020D0604000000000000" pitchFamily="50" charset="-127"/>
+              </a:rPr>
+              <a:t>4) </a:t>
+            </a:r>
+            <a:r>
+              <a:rPr lang="en-US" altLang="ko-KR" dirty="0" err="1" smtClean="0">
+                <a:solidFill>
+                  <a:prstClr val="black"/>
+                </a:solidFill>
+                <a:latin typeface="나눔고딕" panose="020D0604000000000000" pitchFamily="50" charset="-127"/>
+                <a:ea typeface="나눔고딕" panose="020D0604000000000000" pitchFamily="50" charset="-127"/>
+              </a:rPr>
+              <a:t>infiniteGrid</a:t>
+            </a:r>
+            <a:r>
+              <a:rPr lang="ko-KR" altLang="en-US" dirty="0">
+                <a:solidFill>
+                  <a:prstClr val="black"/>
+                </a:solidFill>
+                <a:latin typeface="나눔고딕" panose="020D0604000000000000" pitchFamily="50" charset="-127"/>
+                <a:ea typeface="나눔고딕" panose="020D0604000000000000" pitchFamily="50" charset="-127"/>
+              </a:rPr>
+              <a:t>의 다른 </a:t>
+            </a:r>
+            <a:r>
+              <a:rPr lang="ko-KR" altLang="en-US" dirty="0" err="1">
+                <a:solidFill>
+                  <a:prstClr val="black"/>
+                </a:solidFill>
+                <a:latin typeface="나눔고딕" panose="020D0604000000000000" pitchFamily="50" charset="-127"/>
+                <a:ea typeface="나눔고딕" panose="020D0604000000000000" pitchFamily="50" charset="-127"/>
+              </a:rPr>
+              <a:t>메소드의</a:t>
+            </a:r>
+            <a:r>
+              <a:rPr lang="ko-KR" altLang="en-US" dirty="0">
+                <a:solidFill>
+                  <a:prstClr val="black"/>
+                </a:solidFill>
+                <a:latin typeface="나눔고딕" panose="020D0604000000000000" pitchFamily="50" charset="-127"/>
+                <a:ea typeface="나눔고딕" panose="020D0604000000000000" pitchFamily="50" charset="-127"/>
+              </a:rPr>
+              <a:t> 값을 확인해 본다</a:t>
+            </a:r>
+            <a:r>
+              <a:rPr lang="en-US" altLang="ko-KR" dirty="0">
+                <a:solidFill>
+                  <a:prstClr val="black"/>
+                </a:solidFill>
+                <a:latin typeface="나눔고딕" panose="020D0604000000000000" pitchFamily="50" charset="-127"/>
+                <a:ea typeface="나눔고딕" panose="020D0604000000000000" pitchFamily="50" charset="-127"/>
+              </a:rPr>
+              <a:t>.</a:t>
+            </a:r>
+          </a:p>
+          <a:p>
+            <a:pPr marL="742950" lvl="1" indent="-285750">
+              <a:buFont typeface="Arial" panose="020B0604020202020204" pitchFamily="34" charset="0"/>
+              <a:buChar char="•"/>
+            </a:pPr>
+            <a:r>
+              <a:rPr lang="en-US" altLang="ko-KR" dirty="0">
+                <a:solidFill>
+                  <a:prstClr val="black"/>
+                </a:solidFill>
+                <a:latin typeface="나눔고딕" panose="020D0604000000000000" pitchFamily="50" charset="-127"/>
+                <a:ea typeface="나눔고딕" panose="020D0604000000000000" pitchFamily="50" charset="-127"/>
+              </a:rPr>
+              <a:t>Append </a:t>
+            </a:r>
+            <a:r>
+              <a:rPr lang="ko-KR" altLang="en-US" dirty="0">
+                <a:solidFill>
+                  <a:prstClr val="black"/>
+                </a:solidFill>
+                <a:latin typeface="나눔고딕" panose="020D0604000000000000" pitchFamily="50" charset="-127"/>
+                <a:ea typeface="나눔고딕" panose="020D0604000000000000" pitchFamily="50" charset="-127"/>
+              </a:rPr>
+              <a:t>시</a:t>
+            </a:r>
+            <a:r>
+              <a:rPr lang="en-US" altLang="ko-KR" dirty="0">
+                <a:solidFill>
+                  <a:prstClr val="black"/>
+                </a:solidFill>
+                <a:latin typeface="나눔고딕" panose="020D0604000000000000" pitchFamily="50" charset="-127"/>
+                <a:ea typeface="나눔고딕" panose="020D0604000000000000" pitchFamily="50" charset="-127"/>
+              </a:rPr>
+              <a:t> </a:t>
+            </a:r>
+            <a:r>
+              <a:rPr lang="en-US" altLang="ko-KR" dirty="0" err="1">
+                <a:solidFill>
+                  <a:srgbClr val="00B0F0"/>
+                </a:solidFill>
+                <a:latin typeface="나눔고딕" panose="020D0604000000000000" pitchFamily="50" charset="-127"/>
+                <a:ea typeface="나눔고딕" panose="020D0604000000000000" pitchFamily="50" charset="-127"/>
+              </a:rPr>
+              <a:t>isProcessing</a:t>
+            </a:r>
+            <a:r>
+              <a:rPr lang="en-US" altLang="ko-KR" dirty="0">
+                <a:solidFill>
+                  <a:prstClr val="black"/>
+                </a:solidFill>
+                <a:latin typeface="나눔고딕" panose="020D0604000000000000" pitchFamily="50" charset="-127"/>
+                <a:ea typeface="나눔고딕" panose="020D0604000000000000" pitchFamily="50" charset="-127"/>
+              </a:rPr>
+              <a:t> </a:t>
+            </a:r>
+            <a:r>
+              <a:rPr lang="ko-KR" altLang="en-US" dirty="0" err="1">
+                <a:solidFill>
+                  <a:prstClr val="black"/>
+                </a:solidFill>
+                <a:latin typeface="나눔고딕" panose="020D0604000000000000" pitchFamily="50" charset="-127"/>
+                <a:ea typeface="나눔고딕" panose="020D0604000000000000" pitchFamily="50" charset="-127"/>
+              </a:rPr>
+              <a:t>함수값을</a:t>
+            </a:r>
+            <a:r>
+              <a:rPr lang="ko-KR" altLang="en-US" dirty="0">
+                <a:solidFill>
+                  <a:prstClr val="black"/>
+                </a:solidFill>
+                <a:latin typeface="나눔고딕" panose="020D0604000000000000" pitchFamily="50" charset="-127"/>
+                <a:ea typeface="나눔고딕" panose="020D0604000000000000" pitchFamily="50" charset="-127"/>
+              </a:rPr>
+              <a:t> 확인한다</a:t>
+            </a:r>
+            <a:r>
+              <a:rPr lang="en-US" altLang="ko-KR" dirty="0">
+                <a:solidFill>
+                  <a:prstClr val="black"/>
+                </a:solidFill>
+                <a:latin typeface="나눔고딕" panose="020D0604000000000000" pitchFamily="50" charset="-127"/>
+                <a:ea typeface="나눔고딕" panose="020D0604000000000000" pitchFamily="50" charset="-127"/>
+              </a:rPr>
+              <a:t>.</a:t>
+            </a:r>
+          </a:p>
+          <a:p>
+            <a:pPr marL="742950" lvl="1" indent="-285750">
+              <a:buFont typeface="Arial" panose="020B0604020202020204" pitchFamily="34" charset="0"/>
+              <a:buChar char="•"/>
+            </a:pPr>
+            <a:r>
+              <a:rPr lang="en-US" altLang="ko-KR" dirty="0" err="1">
+                <a:solidFill>
+                  <a:srgbClr val="00B0F0"/>
+                </a:solidFill>
+                <a:latin typeface="나눔고딕" panose="020D0604000000000000" pitchFamily="50" charset="-127"/>
+                <a:ea typeface="나눔고딕" panose="020D0604000000000000" pitchFamily="50" charset="-127"/>
+              </a:rPr>
+              <a:t>getBottomElement</a:t>
+            </a:r>
+            <a:r>
+              <a:rPr lang="en-US" altLang="ko-KR" dirty="0">
+                <a:solidFill>
+                  <a:srgbClr val="00B0F0"/>
+                </a:solidFill>
+                <a:latin typeface="나눔고딕" panose="020D0604000000000000" pitchFamily="50" charset="-127"/>
+                <a:ea typeface="나눔고딕" panose="020D0604000000000000" pitchFamily="50" charset="-127"/>
+              </a:rPr>
+              <a:t> </a:t>
+            </a:r>
+            <a:r>
+              <a:rPr lang="ko-KR" altLang="en-US" dirty="0">
+                <a:solidFill>
+                  <a:prstClr val="black"/>
+                </a:solidFill>
+                <a:latin typeface="나눔고딕" panose="020D0604000000000000" pitchFamily="50" charset="-127"/>
+                <a:ea typeface="나눔고딕" panose="020D0604000000000000" pitchFamily="50" charset="-127"/>
+              </a:rPr>
+              <a:t>함수로 마지막 카드의 </a:t>
+            </a:r>
+            <a:r>
+              <a:rPr lang="en-US" altLang="ko-KR" dirty="0" err="1">
+                <a:solidFill>
+                  <a:prstClr val="black"/>
+                </a:solidFill>
+                <a:latin typeface="나눔고딕" panose="020D0604000000000000" pitchFamily="50" charset="-127"/>
+                <a:ea typeface="나눔고딕" panose="020D0604000000000000" pitchFamily="50" charset="-127"/>
+              </a:rPr>
+              <a:t>HTMLElement</a:t>
+            </a:r>
+            <a:r>
+              <a:rPr lang="ko-KR" altLang="en-US" dirty="0">
+                <a:solidFill>
+                  <a:prstClr val="black"/>
+                </a:solidFill>
+                <a:latin typeface="나눔고딕" panose="020D0604000000000000" pitchFamily="50" charset="-127"/>
+                <a:ea typeface="나눔고딕" panose="020D0604000000000000" pitchFamily="50" charset="-127"/>
+              </a:rPr>
+              <a:t>를 구해본다</a:t>
+            </a:r>
+            <a:r>
+              <a:rPr lang="en-US" altLang="ko-KR" dirty="0" smtClean="0">
+                <a:solidFill>
+                  <a:prstClr val="black"/>
+                </a:solidFill>
+                <a:latin typeface="나눔고딕" panose="020D0604000000000000" pitchFamily="50" charset="-127"/>
+                <a:ea typeface="나눔고딕" panose="020D0604000000000000" pitchFamily="50" charset="-127"/>
+              </a:rPr>
+              <a:t>.</a:t>
+            </a:r>
             <a:endParaRPr lang="en-US" altLang="ko-KR" sz="2400" dirty="0" smtClean="0">
               <a:solidFill>
                 <a:prstClr val="black"/>
@@ -36529,568 +37030,6 @@
 </file>
 
 <file path=ppt/slides/slide51.xml><?xml version="1.0" encoding="utf-8"?>
-<p:sld xmlns:a="http://schemas.openxmlformats.org/drawingml/2006/main" xmlns:r="http://schemas.openxmlformats.org/officeDocument/2006/relationships" xmlns:p="http://schemas.openxmlformats.org/presentationml/2006/main">
-  <p:cSld>
-    <p:spTree>
-      <p:nvGrpSpPr>
-        <p:cNvPr id="1" name=""/>
-        <p:cNvGrpSpPr/>
-        <p:nvPr/>
-      </p:nvGrpSpPr>
-      <p:grpSpPr>
-        <a:xfrm>
-          <a:off x="0" y="0"/>
-          <a:ext cx="0" cy="0"/>
-          <a:chOff x="0" y="0"/>
-          <a:chExt cx="0" cy="0"/>
-        </a:xfrm>
-      </p:grpSpPr>
-      <p:sp>
-        <p:nvSpPr>
-          <p:cNvPr id="3" name="직사각형 2"/>
-          <p:cNvSpPr/>
-          <p:nvPr/>
-        </p:nvSpPr>
-        <p:spPr>
-          <a:xfrm>
-            <a:off x="683568" y="1188035"/>
-            <a:ext cx="7344816" cy="3662541"/>
-          </a:xfrm>
-          <a:prstGeom prst="rect">
-            <a:avLst/>
-          </a:prstGeom>
-        </p:spPr>
-        <p:txBody>
-          <a:bodyPr wrap="square">
-            <a:spAutoFit/>
-          </a:bodyPr>
-          <a:lstStyle/>
-          <a:p>
-            <a:r>
-              <a:rPr lang="ko-KR" altLang="en-US" sz="4000" dirty="0" smtClean="0">
-                <a:solidFill>
-                  <a:prstClr val="black"/>
-                </a:solidFill>
-                <a:latin typeface="나눔고딕 ExtraBold" panose="020D0904000000000000" pitchFamily="50" charset="-127"/>
-                <a:ea typeface="나눔고딕 ExtraBold" panose="020D0904000000000000" pitchFamily="50" charset="-127"/>
-              </a:rPr>
-              <a:t>실습 </a:t>
-            </a:r>
-            <a:r>
-              <a:rPr lang="en-US" altLang="ko-KR" sz="4000" dirty="0" smtClean="0">
-                <a:solidFill>
-                  <a:prstClr val="black"/>
-                </a:solidFill>
-                <a:latin typeface="나눔고딕 ExtraBold" panose="020D0904000000000000" pitchFamily="50" charset="-127"/>
-                <a:ea typeface="나눔고딕 ExtraBold" panose="020D0904000000000000" pitchFamily="50" charset="-127"/>
-              </a:rPr>
-              <a:t>#3</a:t>
-            </a:r>
-          </a:p>
-          <a:p>
-            <a:endParaRPr lang="en-US" altLang="ko-KR" sz="2400" dirty="0">
-              <a:solidFill>
-                <a:prstClr val="black"/>
-              </a:solidFill>
-              <a:latin typeface="나눔고딕" panose="020D0604000000000000" pitchFamily="50" charset="-127"/>
-              <a:ea typeface="나눔고딕" panose="020D0604000000000000" pitchFamily="50" charset="-127"/>
-            </a:endParaRPr>
-          </a:p>
-          <a:p>
-            <a:pPr marL="514350" indent="-514350">
-              <a:buFont typeface="+mj-lt"/>
-              <a:buAutoNum type="arabicParenR" startAt="2"/>
-            </a:pPr>
-            <a:r>
-              <a:rPr lang="en-US" altLang="ko-KR" sz="2400" dirty="0" smtClean="0">
-                <a:solidFill>
-                  <a:prstClr val="black"/>
-                </a:solidFill>
-                <a:latin typeface="나눔고딕" panose="020D0604000000000000" pitchFamily="50" charset="-127"/>
-                <a:ea typeface="나눔고딕" panose="020D0604000000000000" pitchFamily="50" charset="-127"/>
-              </a:rPr>
-              <a:t>“append” </a:t>
-            </a:r>
-            <a:r>
-              <a:rPr lang="ko-KR" altLang="en-US" sz="2400" dirty="0" smtClean="0">
-                <a:solidFill>
-                  <a:prstClr val="black"/>
-                </a:solidFill>
-                <a:latin typeface="나눔고딕" panose="020D0604000000000000" pitchFamily="50" charset="-127"/>
-                <a:ea typeface="나눔고딕" panose="020D0604000000000000" pitchFamily="50" charset="-127"/>
-              </a:rPr>
-              <a:t>이벤트 발생시</a:t>
-            </a:r>
-            <a:r>
-              <a:rPr lang="en-US" altLang="ko-KR" sz="2400" dirty="0" smtClean="0">
-                <a:solidFill>
-                  <a:prstClr val="black"/>
-                </a:solidFill>
-                <a:latin typeface="나눔고딕" panose="020D0604000000000000" pitchFamily="50" charset="-127"/>
-                <a:ea typeface="나눔고딕" panose="020D0604000000000000" pitchFamily="50" charset="-127"/>
-              </a:rPr>
-              <a:t>, </a:t>
-            </a:r>
-            <a:r>
-              <a:rPr lang="en-US" altLang="ko-KR" sz="2400" dirty="0" err="1" smtClean="0">
-                <a:solidFill>
-                  <a:srgbClr val="00B0F0"/>
-                </a:solidFill>
-                <a:latin typeface="나눔고딕" panose="020D0604000000000000" pitchFamily="50" charset="-127"/>
-                <a:ea typeface="나눔고딕" panose="020D0604000000000000" pitchFamily="50" charset="-127"/>
-              </a:rPr>
-              <a:t>data.getItems</a:t>
-            </a:r>
-            <a:r>
-              <a:rPr lang="en-US" altLang="ko-KR" sz="2400" dirty="0">
-                <a:solidFill>
-                  <a:srgbClr val="00B0F0"/>
-                </a:solidFill>
-                <a:latin typeface="나눔고딕" panose="020D0604000000000000" pitchFamily="50" charset="-127"/>
-                <a:ea typeface="나눔고딕" panose="020D0604000000000000" pitchFamily="50" charset="-127"/>
-              </a:rPr>
-              <a:t>()</a:t>
-            </a:r>
-            <a:r>
-              <a:rPr lang="ko-KR" altLang="en-US" sz="2400" dirty="0">
-                <a:solidFill>
-                  <a:prstClr val="black"/>
-                </a:solidFill>
-                <a:latin typeface="나눔고딕" panose="020D0604000000000000" pitchFamily="50" charset="-127"/>
-                <a:ea typeface="나눔고딕" panose="020D0604000000000000" pitchFamily="50" charset="-127"/>
-              </a:rPr>
-              <a:t>를 이용하여 얻은 데이터를 </a:t>
-            </a:r>
-            <a:r>
-              <a:rPr lang="en-US" altLang="ko-KR" sz="2400" dirty="0">
-                <a:solidFill>
-                  <a:prstClr val="black"/>
-                </a:solidFill>
-                <a:latin typeface="나눔고딕" panose="020D0604000000000000" pitchFamily="50" charset="-127"/>
-                <a:ea typeface="나눔고딕" panose="020D0604000000000000" pitchFamily="50" charset="-127"/>
-              </a:rPr>
-              <a:t>append</a:t>
-            </a:r>
-            <a:r>
-              <a:rPr lang="ko-KR" altLang="en-US" sz="2400" dirty="0">
-                <a:solidFill>
-                  <a:prstClr val="black"/>
-                </a:solidFill>
-                <a:latin typeface="나눔고딕" panose="020D0604000000000000" pitchFamily="50" charset="-127"/>
-                <a:ea typeface="나눔고딕" panose="020D0604000000000000" pitchFamily="50" charset="-127"/>
-              </a:rPr>
-              <a:t>한다</a:t>
-            </a:r>
-            <a:r>
-              <a:rPr lang="en-US" altLang="ko-KR" sz="2400" dirty="0" smtClean="0">
-                <a:solidFill>
-                  <a:prstClr val="black"/>
-                </a:solidFill>
-                <a:latin typeface="나눔고딕" panose="020D0604000000000000" pitchFamily="50" charset="-127"/>
-                <a:ea typeface="나눔고딕" panose="020D0604000000000000" pitchFamily="50" charset="-127"/>
-              </a:rPr>
-              <a:t>.</a:t>
-            </a:r>
-          </a:p>
-          <a:p>
-            <a:pPr marL="514350" indent="-514350">
-              <a:buFont typeface="+mj-lt"/>
-              <a:buAutoNum type="arabicParenR" startAt="2"/>
-            </a:pPr>
-            <a:r>
-              <a:rPr lang="ko-KR" altLang="en-US" sz="2400" dirty="0" smtClean="0">
-                <a:solidFill>
-                  <a:prstClr val="black"/>
-                </a:solidFill>
-                <a:latin typeface="나눔고딕" panose="020D0604000000000000" pitchFamily="50" charset="-127"/>
-                <a:ea typeface="나눔고딕" panose="020D0604000000000000" pitchFamily="50" charset="-127"/>
-              </a:rPr>
-              <a:t>데이터는 </a:t>
-            </a:r>
-            <a:r>
-              <a:rPr lang="en-US" altLang="ko-KR" sz="2400" dirty="0" smtClean="0">
-                <a:solidFill>
-                  <a:prstClr val="black"/>
-                </a:solidFill>
-                <a:latin typeface="나눔고딕" panose="020D0604000000000000" pitchFamily="50" charset="-127"/>
-                <a:ea typeface="나눔고딕" panose="020D0604000000000000" pitchFamily="50" charset="-127"/>
-              </a:rPr>
-              <a:t>append </a:t>
-            </a:r>
-            <a:r>
-              <a:rPr lang="ko-KR" altLang="en-US" sz="2400" dirty="0" err="1">
-                <a:solidFill>
-                  <a:prstClr val="black"/>
-                </a:solidFill>
-                <a:latin typeface="나눔고딕" panose="020D0604000000000000" pitchFamily="50" charset="-127"/>
-                <a:ea typeface="나눔고딕" panose="020D0604000000000000" pitchFamily="50" charset="-127"/>
-              </a:rPr>
-              <a:t>메소드를</a:t>
-            </a:r>
-            <a:r>
-              <a:rPr lang="ko-KR" altLang="en-US" sz="2400" dirty="0">
-                <a:solidFill>
-                  <a:prstClr val="black"/>
-                </a:solidFill>
-                <a:latin typeface="나눔고딕" panose="020D0604000000000000" pitchFamily="50" charset="-127"/>
-                <a:ea typeface="나눔고딕" panose="020D0604000000000000" pitchFamily="50" charset="-127"/>
-              </a:rPr>
-              <a:t> </a:t>
-            </a:r>
-            <a:r>
-              <a:rPr lang="ko-KR" altLang="en-US" sz="2400" dirty="0" smtClean="0">
-                <a:solidFill>
-                  <a:prstClr val="black"/>
-                </a:solidFill>
-                <a:latin typeface="나눔고딕" panose="020D0604000000000000" pitchFamily="50" charset="-127"/>
-                <a:ea typeface="나눔고딕" panose="020D0604000000000000" pitchFamily="50" charset="-127"/>
-              </a:rPr>
-              <a:t>이용하여 저장한다</a:t>
-            </a:r>
-            <a:r>
-              <a:rPr lang="en-US" altLang="ko-KR" sz="2400" dirty="0" smtClean="0">
-                <a:solidFill>
-                  <a:prstClr val="black"/>
-                </a:solidFill>
-                <a:latin typeface="나눔고딕" panose="020D0604000000000000" pitchFamily="50" charset="-127"/>
-                <a:ea typeface="나눔고딕" panose="020D0604000000000000" pitchFamily="50" charset="-127"/>
-              </a:rPr>
-              <a:t>.</a:t>
-            </a:r>
-          </a:p>
-          <a:p>
-            <a:pPr marL="514350" indent="-514350">
-              <a:buFont typeface="+mj-lt"/>
-              <a:buAutoNum type="arabicParenR" startAt="2"/>
-            </a:pPr>
-            <a:r>
-              <a:rPr lang="en-US" altLang="ko-KR" sz="2400" dirty="0" err="1" smtClean="0">
-                <a:solidFill>
-                  <a:prstClr val="black"/>
-                </a:solidFill>
-                <a:latin typeface="나눔고딕" panose="020D0604000000000000" pitchFamily="50" charset="-127"/>
-                <a:ea typeface="나눔고딕" panose="020D0604000000000000" pitchFamily="50" charset="-127"/>
-              </a:rPr>
-              <a:t>infiniteGrid</a:t>
-            </a:r>
-            <a:r>
-              <a:rPr lang="ko-KR" altLang="en-US" sz="2400" dirty="0" smtClean="0">
-                <a:solidFill>
-                  <a:prstClr val="black"/>
-                </a:solidFill>
-                <a:latin typeface="나눔고딕" panose="020D0604000000000000" pitchFamily="50" charset="-127"/>
-                <a:ea typeface="나눔고딕" panose="020D0604000000000000" pitchFamily="50" charset="-127"/>
-              </a:rPr>
-              <a:t>의 다른 </a:t>
-            </a:r>
-            <a:r>
-              <a:rPr lang="ko-KR" altLang="en-US" sz="2400" dirty="0" err="1" smtClean="0">
-                <a:solidFill>
-                  <a:prstClr val="black"/>
-                </a:solidFill>
-                <a:latin typeface="나눔고딕" panose="020D0604000000000000" pitchFamily="50" charset="-127"/>
-                <a:ea typeface="나눔고딕" panose="020D0604000000000000" pitchFamily="50" charset="-127"/>
-              </a:rPr>
-              <a:t>메소드의</a:t>
-            </a:r>
-            <a:r>
-              <a:rPr lang="ko-KR" altLang="en-US" sz="2400" dirty="0" smtClean="0">
-                <a:solidFill>
-                  <a:prstClr val="black"/>
-                </a:solidFill>
-                <a:latin typeface="나눔고딕" panose="020D0604000000000000" pitchFamily="50" charset="-127"/>
-                <a:ea typeface="나눔고딕" panose="020D0604000000000000" pitchFamily="50" charset="-127"/>
-              </a:rPr>
-              <a:t> 값을 확인해 본다</a:t>
-            </a:r>
-            <a:r>
-              <a:rPr lang="en-US" altLang="ko-KR" sz="2400" dirty="0" smtClean="0">
-                <a:solidFill>
-                  <a:prstClr val="black"/>
-                </a:solidFill>
-                <a:latin typeface="나눔고딕" panose="020D0604000000000000" pitchFamily="50" charset="-127"/>
-                <a:ea typeface="나눔고딕" panose="020D0604000000000000" pitchFamily="50" charset="-127"/>
-              </a:rPr>
-              <a:t>.</a:t>
-            </a:r>
-          </a:p>
-          <a:p>
-            <a:pPr marL="914400" lvl="1" indent="-457200">
-              <a:buFont typeface="+mj-lt"/>
-              <a:buAutoNum type="arabicPeriod"/>
-            </a:pPr>
-            <a:r>
-              <a:rPr lang="en-US" altLang="ko-KR" sz="2400" dirty="0" smtClean="0">
-                <a:solidFill>
-                  <a:prstClr val="black"/>
-                </a:solidFill>
-                <a:latin typeface="나눔고딕" panose="020D0604000000000000" pitchFamily="50" charset="-127"/>
-                <a:ea typeface="나눔고딕" panose="020D0604000000000000" pitchFamily="50" charset="-127"/>
-              </a:rPr>
-              <a:t>Append </a:t>
-            </a:r>
-            <a:r>
-              <a:rPr lang="ko-KR" altLang="en-US" sz="2400" dirty="0" smtClean="0">
-                <a:solidFill>
-                  <a:prstClr val="black"/>
-                </a:solidFill>
-                <a:latin typeface="나눔고딕" panose="020D0604000000000000" pitchFamily="50" charset="-127"/>
-                <a:ea typeface="나눔고딕" panose="020D0604000000000000" pitchFamily="50" charset="-127"/>
-              </a:rPr>
-              <a:t>시</a:t>
-            </a:r>
-            <a:r>
-              <a:rPr lang="en-US" altLang="ko-KR" sz="2400" dirty="0" smtClean="0">
-                <a:solidFill>
-                  <a:prstClr val="black"/>
-                </a:solidFill>
-                <a:latin typeface="나눔고딕" panose="020D0604000000000000" pitchFamily="50" charset="-127"/>
-                <a:ea typeface="나눔고딕" panose="020D0604000000000000" pitchFamily="50" charset="-127"/>
-              </a:rPr>
-              <a:t> </a:t>
-            </a:r>
-            <a:r>
-              <a:rPr lang="en-US" altLang="ko-KR" sz="2400" dirty="0" err="1" smtClean="0">
-                <a:solidFill>
-                  <a:srgbClr val="00B0F0"/>
-                </a:solidFill>
-                <a:latin typeface="나눔고딕" panose="020D0604000000000000" pitchFamily="50" charset="-127"/>
-                <a:ea typeface="나눔고딕" panose="020D0604000000000000" pitchFamily="50" charset="-127"/>
-              </a:rPr>
-              <a:t>isProcessing</a:t>
-            </a:r>
-            <a:r>
-              <a:rPr lang="en-US" altLang="ko-KR" sz="2400" dirty="0" smtClean="0">
-                <a:solidFill>
-                  <a:prstClr val="black"/>
-                </a:solidFill>
-                <a:latin typeface="나눔고딕" panose="020D0604000000000000" pitchFamily="50" charset="-127"/>
-                <a:ea typeface="나눔고딕" panose="020D0604000000000000" pitchFamily="50" charset="-127"/>
-              </a:rPr>
-              <a:t> </a:t>
-            </a:r>
-            <a:r>
-              <a:rPr lang="ko-KR" altLang="en-US" sz="2400" dirty="0" err="1" smtClean="0">
-                <a:solidFill>
-                  <a:prstClr val="black"/>
-                </a:solidFill>
-                <a:latin typeface="나눔고딕" panose="020D0604000000000000" pitchFamily="50" charset="-127"/>
-                <a:ea typeface="나눔고딕" panose="020D0604000000000000" pitchFamily="50" charset="-127"/>
-              </a:rPr>
-              <a:t>함수값을</a:t>
-            </a:r>
-            <a:r>
-              <a:rPr lang="ko-KR" altLang="en-US" sz="2400" dirty="0" smtClean="0">
-                <a:solidFill>
-                  <a:prstClr val="black"/>
-                </a:solidFill>
-                <a:latin typeface="나눔고딕" panose="020D0604000000000000" pitchFamily="50" charset="-127"/>
-                <a:ea typeface="나눔고딕" panose="020D0604000000000000" pitchFamily="50" charset="-127"/>
-              </a:rPr>
-              <a:t> 확인한다</a:t>
-            </a:r>
-            <a:r>
-              <a:rPr lang="en-US" altLang="ko-KR" sz="2400" dirty="0" smtClean="0">
-                <a:solidFill>
-                  <a:prstClr val="black"/>
-                </a:solidFill>
-                <a:latin typeface="나눔고딕" panose="020D0604000000000000" pitchFamily="50" charset="-127"/>
-                <a:ea typeface="나눔고딕" panose="020D0604000000000000" pitchFamily="50" charset="-127"/>
-              </a:rPr>
-              <a:t>.</a:t>
-            </a:r>
-          </a:p>
-          <a:p>
-            <a:pPr marL="914400" lvl="1" indent="-457200">
-              <a:buFont typeface="+mj-lt"/>
-              <a:buAutoNum type="arabicPeriod"/>
-            </a:pPr>
-            <a:r>
-              <a:rPr lang="en-US" altLang="ko-KR" sz="2400" dirty="0" err="1" smtClean="0">
-                <a:solidFill>
-                  <a:srgbClr val="00B0F0"/>
-                </a:solidFill>
-                <a:latin typeface="나눔고딕" panose="020D0604000000000000" pitchFamily="50" charset="-127"/>
-                <a:ea typeface="나눔고딕" panose="020D0604000000000000" pitchFamily="50" charset="-127"/>
-              </a:rPr>
-              <a:t>getBottomElement</a:t>
-            </a:r>
-            <a:r>
-              <a:rPr lang="en-US" altLang="ko-KR" sz="2400" dirty="0" smtClean="0">
-                <a:solidFill>
-                  <a:srgbClr val="00B0F0"/>
-                </a:solidFill>
-                <a:latin typeface="나눔고딕" panose="020D0604000000000000" pitchFamily="50" charset="-127"/>
-                <a:ea typeface="나눔고딕" panose="020D0604000000000000" pitchFamily="50" charset="-127"/>
-              </a:rPr>
-              <a:t> </a:t>
-            </a:r>
-            <a:r>
-              <a:rPr lang="ko-KR" altLang="en-US" sz="2400" dirty="0" smtClean="0">
-                <a:solidFill>
-                  <a:prstClr val="black"/>
-                </a:solidFill>
-                <a:latin typeface="나눔고딕" panose="020D0604000000000000" pitchFamily="50" charset="-127"/>
-                <a:ea typeface="나눔고딕" panose="020D0604000000000000" pitchFamily="50" charset="-127"/>
-              </a:rPr>
-              <a:t>함수로 마지막 카드의 </a:t>
-            </a:r>
-            <a:r>
-              <a:rPr lang="en-US" altLang="ko-KR" sz="2400" dirty="0" err="1" smtClean="0">
-                <a:solidFill>
-                  <a:prstClr val="black"/>
-                </a:solidFill>
-                <a:latin typeface="나눔고딕" panose="020D0604000000000000" pitchFamily="50" charset="-127"/>
-                <a:ea typeface="나눔고딕" panose="020D0604000000000000" pitchFamily="50" charset="-127"/>
-              </a:rPr>
-              <a:t>HTMLElement</a:t>
-            </a:r>
-            <a:r>
-              <a:rPr lang="ko-KR" altLang="en-US" sz="2400" dirty="0" smtClean="0">
-                <a:solidFill>
-                  <a:prstClr val="black"/>
-                </a:solidFill>
-                <a:latin typeface="나눔고딕" panose="020D0604000000000000" pitchFamily="50" charset="-127"/>
-                <a:ea typeface="나눔고딕" panose="020D0604000000000000" pitchFamily="50" charset="-127"/>
-              </a:rPr>
-              <a:t>를 구해본다</a:t>
-            </a:r>
-            <a:r>
-              <a:rPr lang="en-US" altLang="ko-KR" sz="2400" dirty="0" smtClean="0">
-                <a:solidFill>
-                  <a:prstClr val="black"/>
-                </a:solidFill>
-                <a:latin typeface="나눔고딕" panose="020D0604000000000000" pitchFamily="50" charset="-127"/>
-                <a:ea typeface="나눔고딕" panose="020D0604000000000000" pitchFamily="50" charset="-127"/>
-              </a:rPr>
-              <a:t>.</a:t>
-            </a:r>
-          </a:p>
-        </p:txBody>
-      </p:sp>
-      <p:sp>
-        <p:nvSpPr>
-          <p:cNvPr id="4" name="TextBox 3"/>
-          <p:cNvSpPr txBox="1"/>
-          <p:nvPr/>
-        </p:nvSpPr>
-        <p:spPr>
-          <a:xfrm>
-            <a:off x="458028" y="241035"/>
-            <a:ext cx="4223412" cy="387286"/>
-          </a:xfrm>
-          <a:prstGeom prst="rect">
-            <a:avLst/>
-          </a:prstGeom>
-          <a:noFill/>
-        </p:spPr>
-        <p:txBody>
-          <a:bodyPr wrap="square" rtlCol="0">
-            <a:spAutoFit/>
-          </a:bodyPr>
-          <a:lstStyle/>
-          <a:p>
-            <a:pPr>
-              <a:lnSpc>
-                <a:spcPts val="2300"/>
-              </a:lnSpc>
-            </a:pPr>
-            <a:r>
-              <a:rPr lang="en-US" altLang="ko-KR" sz="1600" b="1" spc="-150" dirty="0" err="1">
-                <a:solidFill>
-                  <a:prstClr val="black">
-                    <a:lumMod val="75000"/>
-                    <a:lumOff val="25000"/>
-                  </a:prstClr>
-                </a:solidFill>
-                <a:ea typeface="나눔고딕" pitchFamily="50" charset="-127"/>
-              </a:rPr>
-              <a:t>InfiniteGrid</a:t>
-            </a:r>
-            <a:r>
-              <a:rPr lang="en-US" altLang="ko-KR" sz="1600" b="1" spc="-150" dirty="0">
-                <a:solidFill>
-                  <a:prstClr val="black">
-                    <a:lumMod val="75000"/>
-                    <a:lumOff val="25000"/>
-                  </a:prstClr>
-                </a:solidFill>
-                <a:ea typeface="나눔고딕" pitchFamily="50" charset="-127"/>
-              </a:rPr>
-              <a:t> </a:t>
-            </a:r>
-            <a:r>
-              <a:rPr lang="en-US" altLang="ko-KR" sz="1600" b="1" spc="-150" dirty="0" smtClean="0">
-                <a:solidFill>
-                  <a:prstClr val="black">
-                    <a:lumMod val="75000"/>
-                    <a:lumOff val="25000"/>
-                  </a:prstClr>
-                </a:solidFill>
-                <a:ea typeface="나눔고딕" pitchFamily="50" charset="-127"/>
-              </a:rPr>
-              <a:t>– </a:t>
-            </a:r>
-            <a:r>
-              <a:rPr lang="ko-KR" altLang="en-US" sz="1600" b="1" spc="-150" dirty="0" smtClean="0">
-                <a:solidFill>
-                  <a:prstClr val="black">
-                    <a:lumMod val="75000"/>
-                    <a:lumOff val="25000"/>
-                  </a:prstClr>
-                </a:solidFill>
-                <a:ea typeface="나눔고딕" pitchFamily="50" charset="-127"/>
-              </a:rPr>
-              <a:t>실습 </a:t>
-            </a:r>
-            <a:r>
-              <a:rPr lang="en-US" altLang="ko-KR" sz="1600" b="1" spc="-150" dirty="0" smtClean="0">
-                <a:solidFill>
-                  <a:prstClr val="black">
-                    <a:lumMod val="75000"/>
-                    <a:lumOff val="25000"/>
-                  </a:prstClr>
-                </a:solidFill>
-                <a:ea typeface="나눔고딕" pitchFamily="50" charset="-127"/>
-              </a:rPr>
-              <a:t>#3</a:t>
-            </a:r>
-            <a:endParaRPr lang="en-US" altLang="ko-KR" sz="1600" b="1" spc="-150" dirty="0">
-              <a:solidFill>
-                <a:prstClr val="black">
-                  <a:lumMod val="75000"/>
-                  <a:lumOff val="25000"/>
-                </a:prstClr>
-              </a:solidFill>
-              <a:ea typeface="나눔고딕" pitchFamily="50" charset="-127"/>
-            </a:endParaRPr>
-          </a:p>
-        </p:txBody>
-      </p:sp>
-    </p:spTree>
-    <p:extLst>
-      <p:ext uri="{BB962C8B-B14F-4D97-AF65-F5344CB8AC3E}">
-        <p14:creationId xmlns:p14="http://schemas.microsoft.com/office/powerpoint/2010/main" val="2146704099"/>
-      </p:ext>
-    </p:extLst>
-  </p:cSld>
-  <p:clrMapOvr>
-    <a:masterClrMapping/>
-  </p:clrMapOvr>
-  <p:transition>
-    <p:fade/>
-  </p:transition>
-  <p:timing>
-    <p:tnLst>
-      <p:par>
-        <p:cTn id="1" dur="indefinite" restart="never" nodeType="tmRoot"/>
-      </p:par>
-    </p:tnLst>
-  </p:timing>
-</p:sld>
-</file>
-
-<file path=ppt/slides/slide52.xml><?xml version="1.0" encoding="utf-8"?>
 <p:sld xmlns:a="http://schemas.openxmlformats.org/drawingml/2006/main" xmlns:r="http://schemas.openxmlformats.org/officeDocument/2006/relationships" xmlns:p="http://schemas.openxmlformats.org/presentationml/2006/main">
   <p:cSld>
     <p:spTree>
@@ -37582,7 +37521,7 @@
 </p:sld>
 </file>
 
-<file path=ppt/slides/slide53.xml><?xml version="1.0" encoding="utf-8"?>
+<file path=ppt/slides/slide52.xml><?xml version="1.0" encoding="utf-8"?>
 <p:sld xmlns:a="http://schemas.openxmlformats.org/drawingml/2006/main" xmlns:r="http://schemas.openxmlformats.org/officeDocument/2006/relationships" xmlns:p="http://schemas.openxmlformats.org/presentationml/2006/main">
   <p:cSld>
     <p:spTree>
@@ -39000,7 +38939,7 @@
 </p:sld>
 </file>
 
-<file path=ppt/slides/slide54.xml><?xml version="1.0" encoding="utf-8"?>
+<file path=ppt/slides/slide53.xml><?xml version="1.0" encoding="utf-8"?>
 <p:sld xmlns:a="http://schemas.openxmlformats.org/drawingml/2006/main" xmlns:r="http://schemas.openxmlformats.org/officeDocument/2006/relationships" xmlns:p="http://schemas.openxmlformats.org/presentationml/2006/main">
   <p:cSld>
     <p:spTree>
@@ -40481,7 +40420,7 @@
 </p:sld>
 </file>
 
-<file path=ppt/slides/slide55.xml><?xml version="1.0" encoding="utf-8"?>
+<file path=ppt/slides/slide54.xml><?xml version="1.0" encoding="utf-8"?>
 <p:sld xmlns:a="http://schemas.openxmlformats.org/drawingml/2006/main" xmlns:r="http://schemas.openxmlformats.org/officeDocument/2006/relationships" xmlns:p="http://schemas.openxmlformats.org/presentationml/2006/main">
   <p:cSld>
     <p:spTree>
@@ -42271,7 +42210,7 @@
 </p:sld>
 </file>
 
-<file path=ppt/slides/slide56.xml><?xml version="1.0" encoding="utf-8"?>
+<file path=ppt/slides/slide55.xml><?xml version="1.0" encoding="utf-8"?>
 <p:sld xmlns:a="http://schemas.openxmlformats.org/drawingml/2006/main" xmlns:r="http://schemas.openxmlformats.org/officeDocument/2006/relationships" xmlns:p="http://schemas.openxmlformats.org/presentationml/2006/main">
   <p:cSld>
     <p:spTree>
@@ -44132,7 +44071,7 @@
 </p:sld>
 </file>
 
-<file path=ppt/slides/slide57.xml><?xml version="1.0" encoding="utf-8"?>
+<file path=ppt/slides/slide56.xml><?xml version="1.0" encoding="utf-8"?>
 <p:sld xmlns:a="http://schemas.openxmlformats.org/drawingml/2006/main" xmlns:r="http://schemas.openxmlformats.org/officeDocument/2006/relationships" xmlns:p="http://schemas.openxmlformats.org/presentationml/2006/main">
   <p:cSld>
     <p:spTree>
@@ -45161,7 +45100,7 @@
 </p:sld>
 </file>
 
-<file path=ppt/slides/slide58.xml><?xml version="1.0" encoding="utf-8"?>
+<file path=ppt/slides/slide57.xml><?xml version="1.0" encoding="utf-8"?>
 <p:sld xmlns:a="http://schemas.openxmlformats.org/drawingml/2006/main" xmlns:r="http://schemas.openxmlformats.org/officeDocument/2006/relationships" xmlns:p="http://schemas.openxmlformats.org/presentationml/2006/main">
   <p:cSld>
     <p:spTree>
@@ -45742,7 +45681,7 @@
 </p:sld>
 </file>
 
-<file path=ppt/slides/slide59.xml><?xml version="1.0" encoding="utf-8"?>
+<file path=ppt/slides/slide58.xml><?xml version="1.0" encoding="utf-8"?>
 <p:sld xmlns:a="http://schemas.openxmlformats.org/drawingml/2006/main" xmlns:r="http://schemas.openxmlformats.org/officeDocument/2006/relationships" xmlns:p="http://schemas.openxmlformats.org/presentationml/2006/main">
   <p:cSld>
     <p:spTree>

</xml_diff>